<commit_message>
updated till week 7
</commit_message>
<xml_diff>
--- a/week2/week2_intro_solids.pptx
+++ b/week2/week2_intro_solids.pptx
@@ -5,7 +5,7 @@
     <p:sldMasterId id="2147483648" r:id="rId1"/>
   </p:sldMasterIdLst>
   <p:notesMasterIdLst>
-    <p:notesMasterId r:id="rId22"/>
+    <p:notesMasterId r:id="rId24"/>
   </p:notesMasterIdLst>
   <p:sldIdLst>
     <p:sldId id="256" r:id="rId2"/>
@@ -19,15 +19,17 @@
     <p:sldId id="265" r:id="rId10"/>
     <p:sldId id="260" r:id="rId11"/>
     <p:sldId id="261" r:id="rId12"/>
-    <p:sldId id="271" r:id="rId13"/>
-    <p:sldId id="263" r:id="rId14"/>
-    <p:sldId id="270" r:id="rId15"/>
-    <p:sldId id="264" r:id="rId16"/>
-    <p:sldId id="272" r:id="rId17"/>
-    <p:sldId id="276" r:id="rId18"/>
-    <p:sldId id="266" r:id="rId19"/>
-    <p:sldId id="267" r:id="rId20"/>
-    <p:sldId id="273" r:id="rId21"/>
+    <p:sldId id="278" r:id="rId13"/>
+    <p:sldId id="271" r:id="rId14"/>
+    <p:sldId id="263" r:id="rId15"/>
+    <p:sldId id="270" r:id="rId16"/>
+    <p:sldId id="264" r:id="rId17"/>
+    <p:sldId id="277" r:id="rId18"/>
+    <p:sldId id="272" r:id="rId19"/>
+    <p:sldId id="276" r:id="rId20"/>
+    <p:sldId id="266" r:id="rId21"/>
+    <p:sldId id="267" r:id="rId22"/>
+    <p:sldId id="273" r:id="rId23"/>
   </p:sldIdLst>
   <p:sldSz cx="12192000" cy="6858000"/>
   <p:notesSz cx="6858000" cy="9144000"/>
@@ -227,7 +229,7 @@
           <a:p>
             <a:fld id="{15636A3F-2453-5D45-ADBD-8F030C3F02C6}" type="datetimeFigureOut">
               <a:rPr lang="en-US" smtClean="0"/>
-              <a:t>4/29/21</a:t>
+              <a:t>5/12/21</a:t>
             </a:fld>
             <a:endParaRPr lang="en-US"/>
           </a:p>
@@ -760,6 +762,93 @@
 </p:notes>
 </file>
 
+<file path=ppt/notesSlides/notesSlide4.xml><?xml version="1.0" encoding="utf-8"?>
+<p:notes xmlns:a="http://schemas.openxmlformats.org/drawingml/2006/main" xmlns:r="http://schemas.openxmlformats.org/officeDocument/2006/relationships" xmlns:p="http://schemas.openxmlformats.org/presentationml/2006/main">
+  <p:cSld>
+    <p:spTree>
+      <p:nvGrpSpPr>
+        <p:cNvPr id="1" name=""/>
+        <p:cNvGrpSpPr/>
+        <p:nvPr/>
+      </p:nvGrpSpPr>
+      <p:grpSpPr>
+        <a:xfrm>
+          <a:off x="0" y="0"/>
+          <a:ext cx="0" cy="0"/>
+          <a:chOff x="0" y="0"/>
+          <a:chExt cx="0" cy="0"/>
+        </a:xfrm>
+      </p:grpSpPr>
+      <p:sp>
+        <p:nvSpPr>
+          <p:cNvPr id="2" name="Slide Image Placeholder 1"/>
+          <p:cNvSpPr>
+            <a:spLocks noGrp="1" noRot="1" noChangeAspect="1"/>
+          </p:cNvSpPr>
+          <p:nvPr>
+            <p:ph type="sldImg"/>
+          </p:nvPr>
+        </p:nvSpPr>
+        <p:spPr/>
+      </p:sp>
+      <p:sp>
+        <p:nvSpPr>
+          <p:cNvPr id="3" name="Notes Placeholder 2"/>
+          <p:cNvSpPr>
+            <a:spLocks noGrp="1"/>
+          </p:cNvSpPr>
+          <p:nvPr>
+            <p:ph type="body" idx="1"/>
+          </p:nvPr>
+        </p:nvSpPr>
+        <p:spPr/>
+        <p:txBody>
+          <a:bodyPr/>
+          <a:lstStyle/>
+          <a:p>
+            <a:r>
+              <a:rPr lang="en-US" dirty="0"/>
+              <a:t>These 6 equations are interlinked, actually there are only 3 independent equations</a:t>
+            </a:r>
+          </a:p>
+        </p:txBody>
+      </p:sp>
+      <p:sp>
+        <p:nvSpPr>
+          <p:cNvPr id="4" name="Slide Number Placeholder 3"/>
+          <p:cNvSpPr>
+            <a:spLocks noGrp="1"/>
+          </p:cNvSpPr>
+          <p:nvPr>
+            <p:ph type="sldNum" sz="quarter" idx="10"/>
+          </p:nvPr>
+        </p:nvSpPr>
+        <p:spPr/>
+        <p:txBody>
+          <a:bodyPr/>
+          <a:lstStyle/>
+          <a:p>
+            <a:fld id="{4A9392C1-237B-9D4F-B687-A9ED0BF3B450}" type="slidenum">
+              <a:rPr lang="en-US" smtClean="0"/>
+              <a:t>15</a:t>
+            </a:fld>
+            <a:endParaRPr lang="en-US"/>
+          </a:p>
+        </p:txBody>
+      </p:sp>
+    </p:spTree>
+    <p:extLst>
+      <p:ext uri="{BB962C8B-B14F-4D97-AF65-F5344CB8AC3E}">
+        <p14:creationId xmlns:p14="http://schemas.microsoft.com/office/powerpoint/2010/main" val="4205061510"/>
+      </p:ext>
+    </p:extLst>
+  </p:cSld>
+  <p:clrMapOvr>
+    <a:masterClrMapping/>
+  </p:clrMapOvr>
+</p:notes>
+</file>
+
 <file path=ppt/slideLayouts/slideLayout1.xml><?xml version="1.0" encoding="utf-8"?>
 <p:sldLayout xmlns:a="http://schemas.openxmlformats.org/drawingml/2006/main" xmlns:r="http://schemas.openxmlformats.org/officeDocument/2006/relationships" xmlns:p="http://schemas.openxmlformats.org/presentationml/2006/main" type="title" preserve="1">
   <p:cSld name="Title Slide">
@@ -940,7 +1029,7 @@
             <a:fld id="{B1F62F99-EC1A-0449-A74E-A6D89C7B7276}" type="datetimeFigureOut">
               <a:rPr lang="en-US" smtClean="0"/>
               <a:pPr/>
-              <a:t>4/29/21</a:t>
+              <a:t>5/12/21</a:t>
             </a:fld>
             <a:endParaRPr lang="en-US"/>
           </a:p>
@@ -1105,7 +1194,7 @@
             <a:fld id="{B1F62F99-EC1A-0449-A74E-A6D89C7B7276}" type="datetimeFigureOut">
               <a:rPr lang="en-US" smtClean="0"/>
               <a:pPr/>
-              <a:t>4/29/21</a:t>
+              <a:t>5/12/21</a:t>
             </a:fld>
             <a:endParaRPr lang="en-US"/>
           </a:p>
@@ -1280,7 +1369,7 @@
             <a:fld id="{B1F62F99-EC1A-0449-A74E-A6D89C7B7276}" type="datetimeFigureOut">
               <a:rPr lang="en-US" smtClean="0"/>
               <a:pPr/>
-              <a:t>4/29/21</a:t>
+              <a:t>5/12/21</a:t>
             </a:fld>
             <a:endParaRPr lang="en-US"/>
           </a:p>
@@ -1445,7 +1534,7 @@
             <a:fld id="{B1F62F99-EC1A-0449-A74E-A6D89C7B7276}" type="datetimeFigureOut">
               <a:rPr lang="en-US" smtClean="0"/>
               <a:pPr/>
-              <a:t>4/29/21</a:t>
+              <a:t>5/12/21</a:t>
             </a:fld>
             <a:endParaRPr lang="en-US"/>
           </a:p>
@@ -1687,7 +1776,7 @@
             <a:fld id="{B1F62F99-EC1A-0449-A74E-A6D89C7B7276}" type="datetimeFigureOut">
               <a:rPr lang="en-US" smtClean="0"/>
               <a:pPr/>
-              <a:t>4/29/21</a:t>
+              <a:t>5/12/21</a:t>
             </a:fld>
             <a:endParaRPr lang="en-US"/>
           </a:p>
@@ -1969,7 +2058,7 @@
             <a:fld id="{B1F62F99-EC1A-0449-A74E-A6D89C7B7276}" type="datetimeFigureOut">
               <a:rPr lang="en-US" smtClean="0"/>
               <a:pPr/>
-              <a:t>4/29/21</a:t>
+              <a:t>5/12/21</a:t>
             </a:fld>
             <a:endParaRPr lang="en-US"/>
           </a:p>
@@ -2385,7 +2474,7 @@
             <a:fld id="{B1F62F99-EC1A-0449-A74E-A6D89C7B7276}" type="datetimeFigureOut">
               <a:rPr lang="en-US" smtClean="0"/>
               <a:pPr/>
-              <a:t>4/29/21</a:t>
+              <a:t>5/12/21</a:t>
             </a:fld>
             <a:endParaRPr lang="en-US"/>
           </a:p>
@@ -2499,7 +2588,7 @@
             <a:fld id="{B1F62F99-EC1A-0449-A74E-A6D89C7B7276}" type="datetimeFigureOut">
               <a:rPr lang="en-US" smtClean="0"/>
               <a:pPr/>
-              <a:t>4/29/21</a:t>
+              <a:t>5/12/21</a:t>
             </a:fld>
             <a:endParaRPr lang="en-US"/>
           </a:p>
@@ -2591,7 +2680,7 @@
             <a:fld id="{B1F62F99-EC1A-0449-A74E-A6D89C7B7276}" type="datetimeFigureOut">
               <a:rPr lang="en-US" smtClean="0"/>
               <a:pPr/>
-              <a:t>4/29/21</a:t>
+              <a:t>5/12/21</a:t>
             </a:fld>
             <a:endParaRPr lang="en-US"/>
           </a:p>
@@ -2863,7 +2952,7 @@
             <a:fld id="{B1F62F99-EC1A-0449-A74E-A6D89C7B7276}" type="datetimeFigureOut">
               <a:rPr lang="en-US" smtClean="0"/>
               <a:pPr/>
-              <a:t>4/29/21</a:t>
+              <a:t>5/12/21</a:t>
             </a:fld>
             <a:endParaRPr lang="en-US"/>
           </a:p>
@@ -3112,7 +3201,7 @@
             <a:fld id="{B1F62F99-EC1A-0449-A74E-A6D89C7B7276}" type="datetimeFigureOut">
               <a:rPr lang="en-US" smtClean="0"/>
               <a:pPr/>
-              <a:t>4/29/21</a:t>
+              <a:t>5/12/21</a:t>
             </a:fld>
             <a:endParaRPr lang="en-US"/>
           </a:p>
@@ -3320,7 +3409,7 @@
             <a:fld id="{B1F62F99-EC1A-0449-A74E-A6D89C7B7276}" type="datetimeFigureOut">
               <a:rPr lang="en-US" smtClean="0"/>
               <a:pPr/>
-              <a:t>4/29/21</a:t>
+              <a:t>5/12/21</a:t>
             </a:fld>
             <a:endParaRPr lang="en-US"/>
           </a:p>
@@ -4200,7 +4289,7 @@
 </file>
 
 <file path=ppt/slides/slide12.xml><?xml version="1.0" encoding="utf-8"?>
-<p:sld xmlns:a="http://schemas.openxmlformats.org/drawingml/2006/main" xmlns:r="http://schemas.openxmlformats.org/officeDocument/2006/relationships" xmlns:p="http://schemas.openxmlformats.org/presentationml/2006/main">
+<p:sld xmlns:a="http://schemas.openxmlformats.org/drawingml/2006/main" xmlns:r="http://schemas.openxmlformats.org/officeDocument/2006/relationships" xmlns:p="http://schemas.openxmlformats.org/presentationml/2006/main" show="0">
   <p:cSld>
     <p:spTree>
       <p:nvGrpSpPr>
@@ -4218,13 +4307,7 @@
       </p:grpSpPr>
       <p:sp>
         <p:nvSpPr>
-          <p:cNvPr id="3" name="TextBox 2">
-            <a:extLst>
-              <a:ext uri="{FF2B5EF4-FFF2-40B4-BE49-F238E27FC236}">
-                <a16:creationId xmlns:a16="http://schemas.microsoft.com/office/drawing/2014/main" id="{E5ECC84A-2048-7A4E-894F-D7B3CE827C35}"/>
-              </a:ext>
-            </a:extLst>
-          </p:cNvPr>
+          <p:cNvPr id="4" name="TextBox 3"/>
           <p:cNvSpPr txBox="1"/>
           <p:nvPr/>
         </p:nvSpPr>
@@ -4251,7 +4334,7 @@
                   <a:srgbClr val="000090"/>
                 </a:solidFill>
               </a:rPr>
-              <a:t>Decomposing the displacement gradient</a:t>
+              <a:t>Deformations, Strains and Rotations</a:t>
             </a:r>
             <a:endParaRPr lang="en-US" sz="2800" b="1" dirty="0">
               <a:solidFill>
@@ -4261,12 +4344,47 @@
           </a:p>
         </p:txBody>
       </p:sp>
+      <p:sp>
+        <p:nvSpPr>
+          <p:cNvPr id="9" name="TextBox 8">
+            <a:extLst>
+              <a:ext uri="{FF2B5EF4-FFF2-40B4-BE49-F238E27FC236}">
+                <a16:creationId xmlns:a16="http://schemas.microsoft.com/office/drawing/2014/main" id="{17E8960E-93CA-DD47-8BA5-A8D7054025F7}"/>
+              </a:ext>
+            </a:extLst>
+          </p:cNvPr>
+          <p:cNvSpPr txBox="1"/>
+          <p:nvPr/>
+        </p:nvSpPr>
+        <p:spPr>
+          <a:xfrm>
+            <a:off x="910973" y="1286614"/>
+            <a:ext cx="10370053" cy="769441"/>
+          </a:xfrm>
+          <a:prstGeom prst="rect">
+            <a:avLst/>
+          </a:prstGeom>
+          <a:noFill/>
+        </p:spPr>
+        <p:txBody>
+          <a:bodyPr wrap="square" rtlCol="0">
+            <a:spAutoFit/>
+          </a:bodyPr>
+          <a:lstStyle/>
+          <a:p>
+            <a:r>
+              <a:rPr lang="en-US" sz="2200" dirty="0"/>
+              <a:t>For a 3 component displacement field, write out all components of the rotation tensor. Can you represent this as a cross product?</a:t>
+            </a:r>
+          </a:p>
+        </p:txBody>
+      </p:sp>
       <p:pic>
         <p:nvPicPr>
-          <p:cNvPr id="8" name="Picture 7">
+          <p:cNvPr id="5" name="Picture 4">
             <a:extLst>
               <a:ext uri="{FF2B5EF4-FFF2-40B4-BE49-F238E27FC236}">
-                <a16:creationId xmlns:a16="http://schemas.microsoft.com/office/drawing/2014/main" id="{53EB8D5F-632E-6E41-A643-3FE4999D0737}"/>
+                <a16:creationId xmlns:a16="http://schemas.microsoft.com/office/drawing/2014/main" id="{3F55E755-FBED-F549-B9AA-8A1B6C6CFE6D}"/>
               </a:ext>
             </a:extLst>
           </p:cNvPr>
@@ -4275,74 +4393,16 @@
           </p:cNvPicPr>
           <p:nvPr/>
         </p:nvPicPr>
-        <p:blipFill rotWithShape="1">
+        <p:blipFill>
           <a:blip r:embed="rId2"/>
-          <a:srcRect b="50652"/>
-          <a:stretch/>
-        </p:blipFill>
-        <p:spPr>
-          <a:xfrm>
-            <a:off x="0" y="2966104"/>
-            <a:ext cx="6099063" cy="3127328"/>
-          </a:xfrm>
-          <a:prstGeom prst="rect">
-            <a:avLst/>
-          </a:prstGeom>
-        </p:spPr>
-      </p:pic>
-      <p:pic>
-        <p:nvPicPr>
-          <p:cNvPr id="10" name="Picture 9">
-            <a:extLst>
-              <a:ext uri="{FF2B5EF4-FFF2-40B4-BE49-F238E27FC236}">
-                <a16:creationId xmlns:a16="http://schemas.microsoft.com/office/drawing/2014/main" id="{50108EA5-7BFD-4B45-98CC-CC37008E98BE}"/>
-              </a:ext>
-            </a:extLst>
-          </p:cNvPr>
-          <p:cNvPicPr>
-            <a:picLocks noChangeAspect="1"/>
-          </p:cNvPicPr>
-          <p:nvPr/>
-        </p:nvPicPr>
-        <p:blipFill rotWithShape="1">
-          <a:blip r:embed="rId2"/>
-          <a:srcRect t="50652"/>
-          <a:stretch/>
-        </p:blipFill>
-        <p:spPr>
-          <a:xfrm>
-            <a:off x="6092937" y="2966104"/>
-            <a:ext cx="6099063" cy="3127328"/>
-          </a:xfrm>
-          <a:prstGeom prst="rect">
-            <a:avLst/>
-          </a:prstGeom>
-        </p:spPr>
-      </p:pic>
-      <p:pic>
-        <p:nvPicPr>
-          <p:cNvPr id="11" name="Picture 10">
-            <a:extLst>
-              <a:ext uri="{FF2B5EF4-FFF2-40B4-BE49-F238E27FC236}">
-                <a16:creationId xmlns:a16="http://schemas.microsoft.com/office/drawing/2014/main" id="{771ABB44-50F8-1343-BD21-508B42DD5C73}"/>
-              </a:ext>
-            </a:extLst>
-          </p:cNvPr>
-          <p:cNvPicPr>
-            <a:picLocks noChangeAspect="1"/>
-          </p:cNvPicPr>
-          <p:nvPr/>
-        </p:nvPicPr>
-        <p:blipFill>
-          <a:blip r:embed="rId3"/>
           <a:stretch>
             <a:fillRect/>
           </a:stretch>
         </p:blipFill>
         <p:spPr>
           <a:xfrm>
-            <a:off x="95892" y="1400438"/>
-            <a:ext cx="10972800" cy="1104900"/>
+            <a:off x="3051943" y="1966431"/>
+            <a:ext cx="6088113" cy="4891569"/>
           </a:xfrm>
           <a:prstGeom prst="rect">
             <a:avLst/>
@@ -4352,7 +4412,7 @@
     </p:spTree>
     <p:extLst>
       <p:ext uri="{BB962C8B-B14F-4D97-AF65-F5344CB8AC3E}">
-        <p14:creationId xmlns:p14="http://schemas.microsoft.com/office/powerpoint/2010/main" val="2099209922"/>
+        <p14:creationId xmlns:p14="http://schemas.microsoft.com/office/powerpoint/2010/main" val="2785591313"/>
       </p:ext>
     </p:extLst>
   </p:cSld>
@@ -4381,7 +4441,13 @@
       </p:grpSpPr>
       <p:sp>
         <p:nvSpPr>
-          <p:cNvPr id="4" name="TextBox 3"/>
+          <p:cNvPr id="3" name="TextBox 2">
+            <a:extLst>
+              <a:ext uri="{FF2B5EF4-FFF2-40B4-BE49-F238E27FC236}">
+                <a16:creationId xmlns:a16="http://schemas.microsoft.com/office/drawing/2014/main" id="{E5ECC84A-2048-7A4E-894F-D7B3CE827C35}"/>
+              </a:ext>
+            </a:extLst>
+          </p:cNvPr>
           <p:cNvSpPr txBox="1"/>
           <p:nvPr/>
         </p:nvSpPr>
@@ -4408,7 +4474,7 @@
                   <a:srgbClr val="000090"/>
                 </a:solidFill>
               </a:rPr>
-              <a:t>Compatibility conditions</a:t>
+              <a:t>Decomposing the displacement gradient</a:t>
             </a:r>
             <a:endParaRPr lang="en-US" sz="2800" b="1" dirty="0">
               <a:solidFill>
@@ -4418,45 +4484,98 @@
           </a:p>
         </p:txBody>
       </p:sp>
-      <p:sp>
-        <p:nvSpPr>
-          <p:cNvPr id="3" name="TextBox 2">
+      <p:pic>
+        <p:nvPicPr>
+          <p:cNvPr id="8" name="Picture 7">
             <a:extLst>
               <a:ext uri="{FF2B5EF4-FFF2-40B4-BE49-F238E27FC236}">
-                <a16:creationId xmlns:a16="http://schemas.microsoft.com/office/drawing/2014/main" id="{AA37B832-8FE5-634D-8A80-6B8E6967C746}"/>
+                <a16:creationId xmlns:a16="http://schemas.microsoft.com/office/drawing/2014/main" id="{53EB8D5F-632E-6E41-A643-3FE4999D0737}"/>
               </a:ext>
             </a:extLst>
           </p:cNvPr>
-          <p:cNvSpPr txBox="1"/>
-          <p:nvPr/>
-        </p:nvSpPr>
-        <p:spPr>
-          <a:xfrm>
-            <a:off x="1953800" y="2659559"/>
-            <a:ext cx="8284399" cy="769441"/>
-          </a:xfrm>
-          <a:prstGeom prst="rect">
-            <a:avLst/>
-          </a:prstGeom>
-          <a:noFill/>
-        </p:spPr>
-        <p:txBody>
-          <a:bodyPr wrap="square" rtlCol="0">
-            <a:spAutoFit/>
-          </a:bodyPr>
-          <a:lstStyle/>
-          <a:p>
-            <a:r>
-              <a:rPr lang="en-US" sz="2200" dirty="0"/>
-              <a:t>For a 3 component displacement field, we can easily compute its spatial derivatives =&gt; strains and rotations. But does it work vice versa?</a:t>
-            </a:r>
-          </a:p>
-        </p:txBody>
-      </p:sp>
+          <p:cNvPicPr>
+            <a:picLocks noChangeAspect="1"/>
+          </p:cNvPicPr>
+          <p:nvPr/>
+        </p:nvPicPr>
+        <p:blipFill rotWithShape="1">
+          <a:blip r:embed="rId2"/>
+          <a:srcRect b="50652"/>
+          <a:stretch/>
+        </p:blipFill>
+        <p:spPr>
+          <a:xfrm>
+            <a:off x="0" y="2966104"/>
+            <a:ext cx="6099063" cy="3127328"/>
+          </a:xfrm>
+          <a:prstGeom prst="rect">
+            <a:avLst/>
+          </a:prstGeom>
+        </p:spPr>
+      </p:pic>
+      <p:pic>
+        <p:nvPicPr>
+          <p:cNvPr id="10" name="Picture 9">
+            <a:extLst>
+              <a:ext uri="{FF2B5EF4-FFF2-40B4-BE49-F238E27FC236}">
+                <a16:creationId xmlns:a16="http://schemas.microsoft.com/office/drawing/2014/main" id="{50108EA5-7BFD-4B45-98CC-CC37008E98BE}"/>
+              </a:ext>
+            </a:extLst>
+          </p:cNvPr>
+          <p:cNvPicPr>
+            <a:picLocks noChangeAspect="1"/>
+          </p:cNvPicPr>
+          <p:nvPr/>
+        </p:nvPicPr>
+        <p:blipFill rotWithShape="1">
+          <a:blip r:embed="rId2"/>
+          <a:srcRect t="50652"/>
+          <a:stretch/>
+        </p:blipFill>
+        <p:spPr>
+          <a:xfrm>
+            <a:off x="6092937" y="2966104"/>
+            <a:ext cx="6099063" cy="3127328"/>
+          </a:xfrm>
+          <a:prstGeom prst="rect">
+            <a:avLst/>
+          </a:prstGeom>
+        </p:spPr>
+      </p:pic>
+      <p:pic>
+        <p:nvPicPr>
+          <p:cNvPr id="11" name="Picture 10">
+            <a:extLst>
+              <a:ext uri="{FF2B5EF4-FFF2-40B4-BE49-F238E27FC236}">
+                <a16:creationId xmlns:a16="http://schemas.microsoft.com/office/drawing/2014/main" id="{771ABB44-50F8-1343-BD21-508B42DD5C73}"/>
+              </a:ext>
+            </a:extLst>
+          </p:cNvPr>
+          <p:cNvPicPr>
+            <a:picLocks noChangeAspect="1"/>
+          </p:cNvPicPr>
+          <p:nvPr/>
+        </p:nvPicPr>
+        <p:blipFill>
+          <a:blip r:embed="rId3"/>
+          <a:stretch>
+            <a:fillRect/>
+          </a:stretch>
+        </p:blipFill>
+        <p:spPr>
+          <a:xfrm>
+            <a:off x="95892" y="1400438"/>
+            <a:ext cx="10972800" cy="1104900"/>
+          </a:xfrm>
+          <a:prstGeom prst="rect">
+            <a:avLst/>
+          </a:prstGeom>
+        </p:spPr>
+      </p:pic>
     </p:spTree>
     <p:extLst>
       <p:ext uri="{BB962C8B-B14F-4D97-AF65-F5344CB8AC3E}">
-        <p14:creationId xmlns:p14="http://schemas.microsoft.com/office/powerpoint/2010/main" val="2498318415"/>
+        <p14:creationId xmlns:p14="http://schemas.microsoft.com/office/powerpoint/2010/main" val="2099209922"/>
       </p:ext>
     </p:extLst>
   </p:cSld>
@@ -4524,10 +4643,10 @@
       </p:sp>
       <p:sp>
         <p:nvSpPr>
-          <p:cNvPr id="5" name="TextBox 4">
+          <p:cNvPr id="3" name="TextBox 2">
             <a:extLst>
               <a:ext uri="{FF2B5EF4-FFF2-40B4-BE49-F238E27FC236}">
-                <a16:creationId xmlns:a16="http://schemas.microsoft.com/office/drawing/2014/main" id="{E57728B4-BF78-F240-8A84-D6E7BCCD4E63}"/>
+                <a16:creationId xmlns:a16="http://schemas.microsoft.com/office/drawing/2014/main" id="{AA37B832-8FE5-634D-8A80-6B8E6967C746}"/>
               </a:ext>
             </a:extLst>
           </p:cNvPr>
@@ -4536,8 +4655,8 @@
         </p:nvSpPr>
         <p:spPr>
           <a:xfrm>
-            <a:off x="700584" y="1454581"/>
-            <a:ext cx="10370053" cy="769441"/>
+            <a:off x="1953800" y="2659559"/>
+            <a:ext cx="8284399" cy="769441"/>
           </a:xfrm>
           <a:prstGeom prst="rect">
             <a:avLst/>
@@ -4552,118 +4671,7 @@
           <a:p>
             <a:r>
               <a:rPr lang="en-US" sz="2200" dirty="0"/>
-              <a:t>For 6 independent strain components, there are 9 strain-displacement equations. How to solve? </a:t>
-            </a:r>
-          </a:p>
-        </p:txBody>
-      </p:sp>
-      <p:pic>
-        <p:nvPicPr>
-          <p:cNvPr id="6" name="Picture 5">
-            <a:extLst>
-              <a:ext uri="{FF2B5EF4-FFF2-40B4-BE49-F238E27FC236}">
-                <a16:creationId xmlns:a16="http://schemas.microsoft.com/office/drawing/2014/main" id="{825314E9-035D-1145-B2D0-FA062FF28F47}"/>
-              </a:ext>
-            </a:extLst>
-          </p:cNvPr>
-          <p:cNvPicPr>
-            <a:picLocks noChangeAspect="1"/>
-          </p:cNvPicPr>
-          <p:nvPr/>
-        </p:nvPicPr>
-        <p:blipFill>
-          <a:blip r:embed="rId2"/>
-          <a:stretch>
-            <a:fillRect/>
-          </a:stretch>
-        </p:blipFill>
-        <p:spPr>
-          <a:xfrm>
-            <a:off x="5181743" y="2436711"/>
-            <a:ext cx="2476249" cy="604439"/>
-          </a:xfrm>
-          <a:prstGeom prst="rect">
-            <a:avLst/>
-          </a:prstGeom>
-        </p:spPr>
-      </p:pic>
-      <p:pic>
-        <p:nvPicPr>
-          <p:cNvPr id="8" name="Picture 7">
-            <a:extLst>
-              <a:ext uri="{FF2B5EF4-FFF2-40B4-BE49-F238E27FC236}">
-                <a16:creationId xmlns:a16="http://schemas.microsoft.com/office/drawing/2014/main" id="{FD2FF049-C2C0-5645-BC24-50B798F8E756}"/>
-              </a:ext>
-            </a:extLst>
-          </p:cNvPr>
-          <p:cNvPicPr>
-            <a:picLocks noChangeAspect="1"/>
-          </p:cNvPicPr>
-          <p:nvPr/>
-        </p:nvPicPr>
-        <p:blipFill>
-          <a:blip r:embed="rId3"/>
-          <a:stretch>
-            <a:fillRect/>
-          </a:stretch>
-        </p:blipFill>
-        <p:spPr>
-          <a:xfrm>
-            <a:off x="4842695" y="3073071"/>
-            <a:ext cx="3880064" cy="2905174"/>
-          </a:xfrm>
-          <a:prstGeom prst="rect">
-            <a:avLst/>
-          </a:prstGeom>
-        </p:spPr>
-      </p:pic>
-      <p:sp>
-        <p:nvSpPr>
-          <p:cNvPr id="9" name="TextBox 8">
-            <a:extLst>
-              <a:ext uri="{FF2B5EF4-FFF2-40B4-BE49-F238E27FC236}">
-                <a16:creationId xmlns:a16="http://schemas.microsoft.com/office/drawing/2014/main" id="{E3DF78F2-CF0E-0A46-B5E6-A7EC17C59D1F}"/>
-              </a:ext>
-            </a:extLst>
-          </p:cNvPr>
-          <p:cNvSpPr txBox="1"/>
-          <p:nvPr/>
-        </p:nvSpPr>
-        <p:spPr>
-          <a:xfrm>
-            <a:off x="162738" y="4397279"/>
-            <a:ext cx="4236237" cy="1107996"/>
-          </a:xfrm>
-          <a:prstGeom prst="rect">
-            <a:avLst/>
-          </a:prstGeom>
-          <a:noFill/>
-        </p:spPr>
-        <p:txBody>
-          <a:bodyPr wrap="square" rtlCol="0">
-            <a:spAutoFit/>
-          </a:bodyPr>
-          <a:lstStyle/>
-          <a:p>
-            <a:r>
-              <a:rPr lang="en-US" sz="2200" dirty="0"/>
-              <a:t>This guarantees that the strains can be integrated to give </a:t>
-            </a:r>
-            <a:r>
-              <a:rPr lang="en-US" sz="2200" b="1" dirty="0"/>
-              <a:t>u</a:t>
-            </a:r>
-            <a:r>
-              <a:rPr lang="en-US" sz="2200" dirty="0"/>
-              <a:t>, but it does not guarantee a unique </a:t>
-            </a:r>
-            <a:r>
-              <a:rPr lang="en-US" sz="2200" b="1" dirty="0"/>
-              <a:t>u</a:t>
-            </a:r>
-            <a:r>
-              <a:rPr lang="en-US" sz="2200" dirty="0"/>
-              <a:t>. Why?</a:t>
+              <a:t>For a 3 component displacement field, we can easily compute its spatial derivatives =&gt; strains and rotations. But does it work vice versa?</a:t>
             </a:r>
           </a:p>
         </p:txBody>
@@ -4671,7 +4679,7 @@
     </p:spTree>
     <p:extLst>
       <p:ext uri="{BB962C8B-B14F-4D97-AF65-F5344CB8AC3E}">
-        <p14:creationId xmlns:p14="http://schemas.microsoft.com/office/powerpoint/2010/main" val="3761706958"/>
+        <p14:creationId xmlns:p14="http://schemas.microsoft.com/office/powerpoint/2010/main" val="2498318415"/>
       </p:ext>
     </p:extLst>
   </p:cSld>
@@ -4727,7 +4735,7 @@
                   <a:srgbClr val="000090"/>
                 </a:solidFill>
               </a:rPr>
-              <a:t>Principal Strains</a:t>
+              <a:t>Compatibility conditions</a:t>
             </a:r>
             <a:endParaRPr lang="en-US" sz="2800" b="1" dirty="0">
               <a:solidFill>
@@ -4739,10 +4747,10 @@
       </p:sp>
       <p:sp>
         <p:nvSpPr>
-          <p:cNvPr id="3" name="TextBox 2">
+          <p:cNvPr id="5" name="TextBox 4">
             <a:extLst>
               <a:ext uri="{FF2B5EF4-FFF2-40B4-BE49-F238E27FC236}">
-                <a16:creationId xmlns:a16="http://schemas.microsoft.com/office/drawing/2014/main" id="{56CDA5E6-CCB3-6A46-A450-DA9463A340A5}"/>
+                <a16:creationId xmlns:a16="http://schemas.microsoft.com/office/drawing/2014/main" id="{E57728B4-BF78-F240-8A84-D6E7BCCD4E63}"/>
               </a:ext>
             </a:extLst>
           </p:cNvPr>
@@ -4751,7 +4759,7 @@
         </p:nvSpPr>
         <p:spPr>
           <a:xfrm>
-            <a:off x="777407" y="1358628"/>
+            <a:off x="700584" y="1454581"/>
             <a:ext cx="10370053" cy="769441"/>
           </a:xfrm>
           <a:prstGeom prst="rect">
@@ -4767,17 +4775,17 @@
           <a:p>
             <a:r>
               <a:rPr lang="en-US" sz="2200" dirty="0"/>
-              <a:t>The strain tensor can be rotated such that all the off-diagonal components vanish and we are left only with diagonal terms – principal strains</a:t>
+              <a:t>For 6 independent strain components, there are 9 strain-displacement equations. How to solve? </a:t>
             </a:r>
           </a:p>
         </p:txBody>
       </p:sp>
       <p:pic>
         <p:nvPicPr>
-          <p:cNvPr id="5" name="Picture 4">
+          <p:cNvPr id="6" name="Picture 5">
             <a:extLst>
               <a:ext uri="{FF2B5EF4-FFF2-40B4-BE49-F238E27FC236}">
-                <a16:creationId xmlns:a16="http://schemas.microsoft.com/office/drawing/2014/main" id="{D5923641-D92A-9B40-A0F4-54DE5D5BE82A}"/>
+                <a16:creationId xmlns:a16="http://schemas.microsoft.com/office/drawing/2014/main" id="{825314E9-035D-1145-B2D0-FA062FF28F47}"/>
               </a:ext>
             </a:extLst>
           </p:cNvPr>
@@ -4787,21 +4795,619 @@
           <p:nvPr/>
         </p:nvPicPr>
         <p:blipFill>
-          <a:blip r:embed="rId2"/>
+          <a:blip r:embed="rId3"/>
           <a:stretch>
             <a:fillRect/>
           </a:stretch>
         </p:blipFill>
         <p:spPr>
           <a:xfrm>
-            <a:off x="2578101" y="2308475"/>
-            <a:ext cx="7035798" cy="3640261"/>
+            <a:off x="5181743" y="2436711"/>
+            <a:ext cx="2476249" cy="604439"/>
           </a:xfrm>
           <a:prstGeom prst="rect">
             <a:avLst/>
           </a:prstGeom>
         </p:spPr>
       </p:pic>
+      <p:pic>
+        <p:nvPicPr>
+          <p:cNvPr id="8" name="Picture 7">
+            <a:extLst>
+              <a:ext uri="{FF2B5EF4-FFF2-40B4-BE49-F238E27FC236}">
+                <a16:creationId xmlns:a16="http://schemas.microsoft.com/office/drawing/2014/main" id="{FD2FF049-C2C0-5645-BC24-50B798F8E756}"/>
+              </a:ext>
+            </a:extLst>
+          </p:cNvPr>
+          <p:cNvPicPr>
+            <a:picLocks noChangeAspect="1"/>
+          </p:cNvPicPr>
+          <p:nvPr/>
+        </p:nvPicPr>
+        <p:blipFill>
+          <a:blip r:embed="rId4"/>
+          <a:stretch>
+            <a:fillRect/>
+          </a:stretch>
+        </p:blipFill>
+        <p:spPr>
+          <a:xfrm>
+            <a:off x="4842695" y="3073071"/>
+            <a:ext cx="3880064" cy="2905174"/>
+          </a:xfrm>
+          <a:prstGeom prst="rect">
+            <a:avLst/>
+          </a:prstGeom>
+        </p:spPr>
+      </p:pic>
+      <p:sp>
+        <p:nvSpPr>
+          <p:cNvPr id="9" name="TextBox 8">
+            <a:extLst>
+              <a:ext uri="{FF2B5EF4-FFF2-40B4-BE49-F238E27FC236}">
+                <a16:creationId xmlns:a16="http://schemas.microsoft.com/office/drawing/2014/main" id="{E3DF78F2-CF0E-0A46-B5E6-A7EC17C59D1F}"/>
+              </a:ext>
+            </a:extLst>
+          </p:cNvPr>
+          <p:cNvSpPr txBox="1"/>
+          <p:nvPr/>
+        </p:nvSpPr>
+        <p:spPr>
+          <a:xfrm>
+            <a:off x="162738" y="4397279"/>
+            <a:ext cx="4236237" cy="1446550"/>
+          </a:xfrm>
+          <a:prstGeom prst="rect">
+            <a:avLst/>
+          </a:prstGeom>
+          <a:noFill/>
+        </p:spPr>
+        <p:txBody>
+          <a:bodyPr wrap="square" rtlCol="0">
+            <a:spAutoFit/>
+          </a:bodyPr>
+          <a:lstStyle/>
+          <a:p>
+            <a:r>
+              <a:rPr lang="en-US" sz="2200" dirty="0"/>
+              <a:t>This guarantees that the strains can be integrated to give a single-valued </a:t>
+            </a:r>
+            <a:r>
+              <a:rPr lang="en-US" sz="2200" b="1" dirty="0"/>
+              <a:t>u</a:t>
+            </a:r>
+            <a:r>
+              <a:rPr lang="en-US" sz="2200" dirty="0"/>
+              <a:t>, but it does not guarantee a unique </a:t>
+            </a:r>
+            <a:r>
+              <a:rPr lang="en-US" sz="2200" b="1" dirty="0"/>
+              <a:t>u</a:t>
+            </a:r>
+            <a:r>
+              <a:rPr lang="en-US" sz="2200" dirty="0"/>
+              <a:t>. Why?</a:t>
+            </a:r>
+          </a:p>
+        </p:txBody>
+      </p:sp>
+    </p:spTree>
+    <p:extLst>
+      <p:ext uri="{BB962C8B-B14F-4D97-AF65-F5344CB8AC3E}">
+        <p14:creationId xmlns:p14="http://schemas.microsoft.com/office/powerpoint/2010/main" val="3761706958"/>
+      </p:ext>
+    </p:extLst>
+  </p:cSld>
+  <p:clrMapOvr>
+    <a:masterClrMapping/>
+  </p:clrMapOvr>
+</p:sld>
+</file>
+
+<file path=ppt/slides/slide16.xml><?xml version="1.0" encoding="utf-8"?>
+<p:sld xmlns:a="http://schemas.openxmlformats.org/drawingml/2006/main" xmlns:r="http://schemas.openxmlformats.org/officeDocument/2006/relationships" xmlns:p="http://schemas.openxmlformats.org/presentationml/2006/main">
+  <p:cSld>
+    <p:spTree>
+      <p:nvGrpSpPr>
+        <p:cNvPr id="1" name=""/>
+        <p:cNvGrpSpPr/>
+        <p:nvPr/>
+      </p:nvGrpSpPr>
+      <p:grpSpPr>
+        <a:xfrm>
+          <a:off x="0" y="0"/>
+          <a:ext cx="0" cy="0"/>
+          <a:chOff x="0" y="0"/>
+          <a:chExt cx="0" cy="0"/>
+        </a:xfrm>
+      </p:grpSpPr>
+      <p:sp>
+        <p:nvSpPr>
+          <p:cNvPr id="4" name="TextBox 3"/>
+          <p:cNvSpPr txBox="1"/>
+          <p:nvPr/>
+        </p:nvSpPr>
+        <p:spPr>
+          <a:xfrm>
+            <a:off x="2280857" y="416452"/>
+            <a:ext cx="7630286" cy="523220"/>
+          </a:xfrm>
+          <a:prstGeom prst="rect">
+            <a:avLst/>
+          </a:prstGeom>
+          <a:noFill/>
+        </p:spPr>
+        <p:txBody>
+          <a:bodyPr wrap="square" rtlCol="0">
+            <a:spAutoFit/>
+          </a:bodyPr>
+          <a:lstStyle/>
+          <a:p>
+            <a:pPr algn="ctr"/>
+            <a:r>
+              <a:rPr lang="en-US" sz="2800" b="1" dirty="0">
+                <a:solidFill>
+                  <a:srgbClr val="000090"/>
+                </a:solidFill>
+              </a:rPr>
+              <a:t>Displacements from strains</a:t>
+            </a:r>
+            <a:endParaRPr lang="en-US" sz="2800" b="1" dirty="0">
+              <a:solidFill>
+                <a:srgbClr val="008000"/>
+              </a:solidFill>
+            </a:endParaRPr>
+          </a:p>
+        </p:txBody>
+      </p:sp>
+      <p:sp>
+        <p:nvSpPr>
+          <p:cNvPr id="6" name="TextBox 5">
+            <a:extLst>
+              <a:ext uri="{FF2B5EF4-FFF2-40B4-BE49-F238E27FC236}">
+                <a16:creationId xmlns:a16="http://schemas.microsoft.com/office/drawing/2014/main" id="{62EC0CC9-4481-974A-9B0E-7E7B56A40347}"/>
+              </a:ext>
+            </a:extLst>
+          </p:cNvPr>
+          <p:cNvSpPr txBox="1"/>
+          <p:nvPr/>
+        </p:nvSpPr>
+        <p:spPr>
+          <a:xfrm>
+            <a:off x="700584" y="1454581"/>
+            <a:ext cx="10370053" cy="4832092"/>
+          </a:xfrm>
+          <a:prstGeom prst="rect">
+            <a:avLst/>
+          </a:prstGeom>
+          <a:noFill/>
+        </p:spPr>
+        <p:txBody>
+          <a:bodyPr wrap="square" rtlCol="0">
+            <a:spAutoFit/>
+          </a:bodyPr>
+          <a:lstStyle/>
+          <a:p>
+            <a:pPr marL="457200" indent="-457200">
+              <a:buFont typeface="Arial" panose="020B0604020202020204" pitchFamily="34" charset="0"/>
+              <a:buChar char="•"/>
+            </a:pPr>
+            <a:r>
+              <a:rPr lang="en-US" sz="2200" dirty="0"/>
+              <a:t>Given a strain tensor (symmetric), first verify if it indeed represents a compatible strain tensor and then integrate it to compute displacements analytically (and numerically)</a:t>
+            </a:r>
+          </a:p>
+          <a:p>
+            <a:pPr marL="914400" lvl="1" indent="-457200">
+              <a:buFont typeface="Arial" panose="020B0604020202020204" pitchFamily="34" charset="0"/>
+              <a:buChar char="•"/>
+            </a:pPr>
+            <a:r>
+              <a:rPr lang="en-US" sz="2200" dirty="0"/>
+              <a:t>1-d problem, 0 &lt; x &lt; 5: </a:t>
+            </a:r>
+            <a:r>
+              <a:rPr lang="el-GR" sz="2200" dirty="0"/>
+              <a:t>ε</a:t>
+            </a:r>
+            <a:r>
+              <a:rPr lang="en-US" sz="2200" baseline="-25000" dirty="0"/>
+              <a:t>xx</a:t>
+            </a:r>
+            <a:r>
+              <a:rPr lang="en-US" sz="2200" dirty="0"/>
+              <a:t> = log(x), compute </a:t>
+            </a:r>
+            <a:r>
+              <a:rPr lang="en-US" sz="2200" dirty="0" err="1"/>
+              <a:t>u</a:t>
+            </a:r>
+            <a:r>
+              <a:rPr lang="en-US" sz="2200" baseline="-25000" dirty="0" err="1"/>
+              <a:t>x</a:t>
+            </a:r>
+            <a:endParaRPr lang="en-US" sz="2200" baseline="-25000" dirty="0"/>
+          </a:p>
+          <a:p>
+            <a:pPr marL="914400" lvl="1" indent="-457200">
+              <a:buFont typeface="Arial" panose="020B0604020202020204" pitchFamily="34" charset="0"/>
+              <a:buChar char="•"/>
+            </a:pPr>
+            <a:r>
+              <a:rPr lang="en-US" sz="2200" dirty="0"/>
+              <a:t>2-d problem, 0 &lt; x &lt; 1, 0 &lt; y &lt; 1: </a:t>
+            </a:r>
+            <a:r>
+              <a:rPr lang="en-US" sz="2200" dirty="0" err="1"/>
+              <a:t>e</a:t>
+            </a:r>
+            <a:r>
+              <a:rPr lang="en-US" sz="2200" baseline="-25000" dirty="0" err="1"/>
+              <a:t>xx</a:t>
+            </a:r>
+            <a:r>
+              <a:rPr lang="en-US" sz="2200" dirty="0" err="1"/>
+              <a:t>,e</a:t>
+            </a:r>
+            <a:r>
+              <a:rPr lang="en-US" sz="2200" baseline="-25000" dirty="0" err="1"/>
+              <a:t>yy</a:t>
+            </a:r>
+            <a:r>
+              <a:rPr lang="en-US" sz="2200" dirty="0" err="1"/>
+              <a:t>,e</a:t>
+            </a:r>
+            <a:r>
+              <a:rPr lang="en-US" sz="2200" baseline="-25000" dirty="0" err="1"/>
+              <a:t>zz</a:t>
+            </a:r>
+            <a:r>
+              <a:rPr lang="en-US" sz="2200" dirty="0" err="1"/>
+              <a:t>,e</a:t>
+            </a:r>
+            <a:r>
+              <a:rPr lang="en-US" sz="2200" baseline="-25000" dirty="0" err="1"/>
+              <a:t>xy</a:t>
+            </a:r>
+            <a:r>
+              <a:rPr lang="en-US" sz="2200" dirty="0"/>
+              <a:t> = 0, 							     </a:t>
+            </a:r>
+            <a:r>
+              <a:rPr lang="en-US" sz="2200" dirty="0" err="1"/>
+              <a:t>e</a:t>
+            </a:r>
+            <a:r>
+              <a:rPr lang="en-US" sz="2200" baseline="-25000" dirty="0" err="1"/>
+              <a:t>zx</a:t>
+            </a:r>
+            <a:r>
+              <a:rPr lang="en-US" sz="2200" dirty="0"/>
+              <a:t> = x/(x</a:t>
+            </a:r>
+            <a:r>
+              <a:rPr lang="en-US" sz="2200" baseline="30000" dirty="0"/>
+              <a:t>2</a:t>
+            </a:r>
+            <a:r>
+              <a:rPr lang="en-US" sz="2200" dirty="0"/>
+              <a:t> + y</a:t>
+            </a:r>
+            <a:r>
+              <a:rPr lang="en-US" sz="2200" baseline="30000" dirty="0"/>
+              <a:t>2</a:t>
+            </a:r>
+            <a:r>
+              <a:rPr lang="en-US" sz="2200" dirty="0"/>
+              <a:t>)</a:t>
+            </a:r>
+          </a:p>
+          <a:p>
+            <a:pPr lvl="1"/>
+            <a:r>
+              <a:rPr lang="en-US" sz="2200" dirty="0"/>
+              <a:t>	</a:t>
+            </a:r>
+            <a:r>
+              <a:rPr lang="en-US" sz="2200" dirty="0" err="1"/>
+              <a:t>e</a:t>
+            </a:r>
+            <a:r>
+              <a:rPr lang="en-US" sz="2200" baseline="-25000" dirty="0" err="1"/>
+              <a:t>zy</a:t>
+            </a:r>
+            <a:r>
+              <a:rPr lang="en-US" sz="2200" dirty="0"/>
+              <a:t> = y/(x</a:t>
+            </a:r>
+            <a:r>
+              <a:rPr lang="en-US" sz="2200" baseline="30000" dirty="0"/>
+              <a:t>2</a:t>
+            </a:r>
+            <a:r>
+              <a:rPr lang="en-US" sz="2200" dirty="0"/>
+              <a:t> + y</a:t>
+            </a:r>
+            <a:r>
+              <a:rPr lang="en-US" sz="2200" baseline="30000" dirty="0"/>
+              <a:t>2</a:t>
+            </a:r>
+            <a:r>
+              <a:rPr lang="en-US" sz="2200" dirty="0"/>
+              <a:t>), compute </a:t>
+            </a:r>
+            <a:r>
+              <a:rPr lang="en-US" sz="2200" dirty="0" err="1"/>
+              <a:t>u</a:t>
+            </a:r>
+            <a:r>
+              <a:rPr lang="en-US" sz="2200" baseline="-25000" dirty="0" err="1"/>
+              <a:t>z</a:t>
+            </a:r>
+            <a:endParaRPr lang="en-US" sz="2200" baseline="-25000" dirty="0"/>
+          </a:p>
+          <a:p>
+            <a:pPr marL="914400" lvl="1" indent="-457200">
+              <a:buFont typeface="Arial" panose="020B0604020202020204" pitchFamily="34" charset="0"/>
+              <a:buChar char="•"/>
+            </a:pPr>
+            <a:r>
+              <a:rPr lang="en-US" sz="2200" dirty="0"/>
+              <a:t>2-d problem, 0 &lt; x &lt; 1, 0 &lt; y &lt; 1: </a:t>
+            </a:r>
+            <a:r>
+              <a:rPr lang="en-US" sz="2200" dirty="0" err="1"/>
+              <a:t>e</a:t>
+            </a:r>
+            <a:r>
+              <a:rPr lang="en-US" sz="2200" baseline="-25000" dirty="0" err="1"/>
+              <a:t>zz</a:t>
+            </a:r>
+            <a:r>
+              <a:rPr lang="en-US" sz="2200" baseline="-25000" dirty="0"/>
+              <a:t> </a:t>
+            </a:r>
+            <a:r>
+              <a:rPr lang="en-US" sz="2200" dirty="0"/>
+              <a:t>, </a:t>
+            </a:r>
+            <a:r>
+              <a:rPr lang="en-US" sz="2200" dirty="0" err="1"/>
+              <a:t>e</a:t>
+            </a:r>
+            <a:r>
+              <a:rPr lang="en-US" sz="2200" baseline="-25000" dirty="0" err="1"/>
+              <a:t>zx</a:t>
+            </a:r>
+            <a:r>
+              <a:rPr lang="en-US" sz="2200" baseline="-25000" dirty="0"/>
+              <a:t> </a:t>
+            </a:r>
+            <a:r>
+              <a:rPr lang="en-US" sz="2200" dirty="0"/>
+              <a:t>, </a:t>
+            </a:r>
+            <a:r>
+              <a:rPr lang="en-US" sz="2200" dirty="0" err="1"/>
+              <a:t>e</a:t>
+            </a:r>
+            <a:r>
+              <a:rPr lang="en-US" sz="2200" baseline="-25000" dirty="0" err="1"/>
+              <a:t>zy</a:t>
+            </a:r>
+            <a:r>
+              <a:rPr lang="en-US" sz="2200" baseline="-25000" dirty="0"/>
+              <a:t> </a:t>
+            </a:r>
+            <a:r>
+              <a:rPr lang="en-US" sz="2200" dirty="0"/>
+              <a:t>= 0,</a:t>
+            </a:r>
+          </a:p>
+          <a:p>
+            <a:pPr lvl="1"/>
+            <a:r>
+              <a:rPr lang="en-US" sz="2200" dirty="0"/>
+              <a:t>	</a:t>
+            </a:r>
+            <a:r>
+              <a:rPr lang="en-US" sz="2200" dirty="0" err="1"/>
+              <a:t>e</a:t>
+            </a:r>
+            <a:r>
+              <a:rPr lang="en-US" sz="2200" baseline="-25000" dirty="0" err="1"/>
+              <a:t>xx</a:t>
+            </a:r>
+            <a:r>
+              <a:rPr lang="en-US" sz="2200" dirty="0"/>
+              <a:t> = ((k+1)x</a:t>
+            </a:r>
+            <a:r>
+              <a:rPr lang="en-US" sz="2200" baseline="30000" dirty="0"/>
+              <a:t>2</a:t>
+            </a:r>
+            <a:r>
+              <a:rPr lang="en-US" sz="2200" dirty="0"/>
+              <a:t>y + (k-3)y</a:t>
+            </a:r>
+            <a:r>
+              <a:rPr lang="en-US" sz="2200" baseline="30000" dirty="0"/>
+              <a:t>3</a:t>
+            </a:r>
+            <a:r>
+              <a:rPr lang="en-US" sz="2200" dirty="0"/>
+              <a:t>)/(x</a:t>
+            </a:r>
+            <a:r>
+              <a:rPr lang="en-US" sz="2200" baseline="30000" dirty="0"/>
+              <a:t>2</a:t>
+            </a:r>
+            <a:r>
+              <a:rPr lang="en-US" sz="2200" dirty="0"/>
+              <a:t> + y</a:t>
+            </a:r>
+            <a:r>
+              <a:rPr lang="en-US" sz="2200" baseline="30000" dirty="0"/>
+              <a:t>2</a:t>
+            </a:r>
+            <a:r>
+              <a:rPr lang="en-US" sz="2200" dirty="0"/>
+              <a:t>)</a:t>
+            </a:r>
+            <a:r>
+              <a:rPr lang="en-US" sz="2200" baseline="30000" dirty="0"/>
+              <a:t>2</a:t>
+            </a:r>
+            <a:r>
+              <a:rPr lang="en-US" sz="2200" dirty="0"/>
+              <a:t> </a:t>
+            </a:r>
+          </a:p>
+          <a:p>
+            <a:pPr lvl="2"/>
+            <a:r>
+              <a:rPr lang="en-US" sz="2200" dirty="0" err="1"/>
+              <a:t>e</a:t>
+            </a:r>
+            <a:r>
+              <a:rPr lang="en-US" sz="2200" baseline="-25000" dirty="0" err="1"/>
+              <a:t>yy</a:t>
+            </a:r>
+            <a:r>
+              <a:rPr lang="en-US" sz="2200" dirty="0"/>
+              <a:t> = ((k-3)x</a:t>
+            </a:r>
+            <a:r>
+              <a:rPr lang="en-US" sz="2200" baseline="30000" dirty="0"/>
+              <a:t>2</a:t>
+            </a:r>
+            <a:r>
+              <a:rPr lang="en-US" sz="2200" dirty="0"/>
+              <a:t>y + (k+1)y</a:t>
+            </a:r>
+            <a:r>
+              <a:rPr lang="en-US" sz="2200" baseline="30000" dirty="0"/>
+              <a:t>3</a:t>
+            </a:r>
+            <a:r>
+              <a:rPr lang="en-US" sz="2200" dirty="0"/>
+              <a:t>) /(x</a:t>
+            </a:r>
+            <a:r>
+              <a:rPr lang="en-US" sz="2200" baseline="30000" dirty="0"/>
+              <a:t>2</a:t>
+            </a:r>
+            <a:r>
+              <a:rPr lang="en-US" sz="2200" dirty="0"/>
+              <a:t> + y</a:t>
+            </a:r>
+            <a:r>
+              <a:rPr lang="en-US" sz="2200" baseline="30000" dirty="0"/>
+              <a:t>2</a:t>
+            </a:r>
+            <a:r>
+              <a:rPr lang="en-US" sz="2200" dirty="0"/>
+              <a:t>)</a:t>
+            </a:r>
+            <a:r>
+              <a:rPr lang="en-US" sz="2200" baseline="30000" dirty="0"/>
+              <a:t>2</a:t>
+            </a:r>
+          </a:p>
+          <a:p>
+            <a:pPr lvl="2"/>
+            <a:r>
+              <a:rPr lang="en-US" sz="2200" dirty="0" err="1"/>
+              <a:t>e</a:t>
+            </a:r>
+            <a:r>
+              <a:rPr lang="en-US" sz="2200" baseline="-25000" dirty="0" err="1"/>
+              <a:t>xy</a:t>
+            </a:r>
+            <a:r>
+              <a:rPr lang="en-US" sz="2200" dirty="0"/>
+              <a:t> = (4xy</a:t>
+            </a:r>
+            <a:r>
+              <a:rPr lang="en-US" sz="2200" baseline="30000" dirty="0"/>
+              <a:t>2</a:t>
+            </a:r>
+            <a:r>
+              <a:rPr lang="en-US" sz="2200" dirty="0"/>
+              <a:t>)/(x</a:t>
+            </a:r>
+            <a:r>
+              <a:rPr lang="en-US" sz="2200" baseline="30000" dirty="0"/>
+              <a:t>2</a:t>
+            </a:r>
+            <a:r>
+              <a:rPr lang="en-US" sz="2200" dirty="0"/>
+              <a:t> + y</a:t>
+            </a:r>
+            <a:r>
+              <a:rPr lang="en-US" sz="2200" baseline="30000" dirty="0"/>
+              <a:t>2</a:t>
+            </a:r>
+            <a:r>
+              <a:rPr lang="en-US" sz="2200" dirty="0"/>
+              <a:t>)</a:t>
+            </a:r>
+            <a:r>
+              <a:rPr lang="en-US" sz="2200" baseline="30000" dirty="0"/>
+              <a:t>2</a:t>
+            </a:r>
+            <a:r>
+              <a:rPr lang="en-US" sz="2200" dirty="0"/>
+              <a:t>, compute </a:t>
+            </a:r>
+            <a:r>
+              <a:rPr lang="en-US" sz="2200" dirty="0" err="1"/>
+              <a:t>u</a:t>
+            </a:r>
+            <a:r>
+              <a:rPr lang="en-US" sz="2200" baseline="-25000" dirty="0" err="1"/>
+              <a:t>x</a:t>
+            </a:r>
+            <a:r>
+              <a:rPr lang="en-US" sz="2200" dirty="0"/>
+              <a:t> and </a:t>
+            </a:r>
+            <a:r>
+              <a:rPr lang="en-US" sz="2200" dirty="0" err="1"/>
+              <a:t>u</a:t>
+            </a:r>
+            <a:r>
+              <a:rPr lang="en-US" sz="2200" baseline="-25000" dirty="0" err="1"/>
+              <a:t>y</a:t>
+            </a:r>
+            <a:r>
+              <a:rPr lang="en-US" sz="2200" dirty="0"/>
+              <a:t> (for k = 4)</a:t>
+            </a:r>
+            <a:endParaRPr lang="en-US" sz="2200" baseline="-25000" dirty="0"/>
+          </a:p>
+          <a:p>
+            <a:pPr marL="914400" lvl="1" indent="-457200">
+              <a:buFont typeface="+mj-lt"/>
+              <a:buAutoNum type="arabicPeriod"/>
+            </a:pPr>
+            <a:endParaRPr lang="en-US" sz="2200" dirty="0"/>
+          </a:p>
+          <a:p>
+            <a:pPr marL="914400" lvl="1" indent="-457200">
+              <a:buFont typeface="+mj-lt"/>
+              <a:buAutoNum type="arabicPeriod"/>
+            </a:pPr>
+            <a:endParaRPr lang="en-US" sz="2200" dirty="0"/>
+          </a:p>
+          <a:p>
+            <a:r>
+              <a:rPr lang="en-US" sz="2200" dirty="0"/>
+              <a:t> </a:t>
+            </a:r>
+          </a:p>
+        </p:txBody>
+      </p:sp>
     </p:spTree>
     <p:extLst>
       <p:ext uri="{BB962C8B-B14F-4D97-AF65-F5344CB8AC3E}">
@@ -4815,7 +5421,141 @@
 </p:sld>
 </file>
 
-<file path=ppt/slides/slide16.xml><?xml version="1.0" encoding="utf-8"?>
+<file path=ppt/slides/slide17.xml><?xml version="1.0" encoding="utf-8"?>
+<p:sld xmlns:a="http://schemas.openxmlformats.org/drawingml/2006/main" xmlns:r="http://schemas.openxmlformats.org/officeDocument/2006/relationships" xmlns:p="http://schemas.openxmlformats.org/presentationml/2006/main">
+  <p:cSld>
+    <p:spTree>
+      <p:nvGrpSpPr>
+        <p:cNvPr id="1" name=""/>
+        <p:cNvGrpSpPr/>
+        <p:nvPr/>
+      </p:nvGrpSpPr>
+      <p:grpSpPr>
+        <a:xfrm>
+          <a:off x="0" y="0"/>
+          <a:ext cx="0" cy="0"/>
+          <a:chOff x="0" y="0"/>
+          <a:chExt cx="0" cy="0"/>
+        </a:xfrm>
+      </p:grpSpPr>
+      <p:sp>
+        <p:nvSpPr>
+          <p:cNvPr id="4" name="TextBox 3"/>
+          <p:cNvSpPr txBox="1"/>
+          <p:nvPr/>
+        </p:nvSpPr>
+        <p:spPr>
+          <a:xfrm>
+            <a:off x="2280857" y="416452"/>
+            <a:ext cx="7630286" cy="523220"/>
+          </a:xfrm>
+          <a:prstGeom prst="rect">
+            <a:avLst/>
+          </a:prstGeom>
+          <a:noFill/>
+        </p:spPr>
+        <p:txBody>
+          <a:bodyPr wrap="square" rtlCol="0">
+            <a:spAutoFit/>
+          </a:bodyPr>
+          <a:lstStyle/>
+          <a:p>
+            <a:pPr algn="ctr"/>
+            <a:r>
+              <a:rPr lang="en-US" sz="2800" b="1" dirty="0">
+                <a:solidFill>
+                  <a:srgbClr val="000090"/>
+                </a:solidFill>
+              </a:rPr>
+              <a:t>Principal Strains</a:t>
+            </a:r>
+            <a:endParaRPr lang="en-US" sz="2800" b="1" dirty="0">
+              <a:solidFill>
+                <a:srgbClr val="008000"/>
+              </a:solidFill>
+            </a:endParaRPr>
+          </a:p>
+        </p:txBody>
+      </p:sp>
+      <p:sp>
+        <p:nvSpPr>
+          <p:cNvPr id="3" name="TextBox 2">
+            <a:extLst>
+              <a:ext uri="{FF2B5EF4-FFF2-40B4-BE49-F238E27FC236}">
+                <a16:creationId xmlns:a16="http://schemas.microsoft.com/office/drawing/2014/main" id="{56CDA5E6-CCB3-6A46-A450-DA9463A340A5}"/>
+              </a:ext>
+            </a:extLst>
+          </p:cNvPr>
+          <p:cNvSpPr txBox="1"/>
+          <p:nvPr/>
+        </p:nvSpPr>
+        <p:spPr>
+          <a:xfrm>
+            <a:off x="777407" y="1358628"/>
+            <a:ext cx="10370053" cy="769441"/>
+          </a:xfrm>
+          <a:prstGeom prst="rect">
+            <a:avLst/>
+          </a:prstGeom>
+          <a:noFill/>
+        </p:spPr>
+        <p:txBody>
+          <a:bodyPr wrap="square" rtlCol="0">
+            <a:spAutoFit/>
+          </a:bodyPr>
+          <a:lstStyle/>
+          <a:p>
+            <a:r>
+              <a:rPr lang="en-US" sz="2200" dirty="0"/>
+              <a:t>The strain tensor can be rotated such that all the off-diagonal components vanish and we are left only with diagonal terms – principal strains</a:t>
+            </a:r>
+          </a:p>
+        </p:txBody>
+      </p:sp>
+      <p:pic>
+        <p:nvPicPr>
+          <p:cNvPr id="5" name="Picture 4">
+            <a:extLst>
+              <a:ext uri="{FF2B5EF4-FFF2-40B4-BE49-F238E27FC236}">
+                <a16:creationId xmlns:a16="http://schemas.microsoft.com/office/drawing/2014/main" id="{D5923641-D92A-9B40-A0F4-54DE5D5BE82A}"/>
+              </a:ext>
+            </a:extLst>
+          </p:cNvPr>
+          <p:cNvPicPr>
+            <a:picLocks noChangeAspect="1"/>
+          </p:cNvPicPr>
+          <p:nvPr/>
+        </p:nvPicPr>
+        <p:blipFill>
+          <a:blip r:embed="rId2"/>
+          <a:stretch>
+            <a:fillRect/>
+          </a:stretch>
+        </p:blipFill>
+        <p:spPr>
+          <a:xfrm>
+            <a:off x="2578101" y="2308475"/>
+            <a:ext cx="7035798" cy="3640261"/>
+          </a:xfrm>
+          <a:prstGeom prst="rect">
+            <a:avLst/>
+          </a:prstGeom>
+        </p:spPr>
+      </p:pic>
+    </p:spTree>
+    <p:extLst>
+      <p:ext uri="{BB962C8B-B14F-4D97-AF65-F5344CB8AC3E}">
+        <p14:creationId xmlns:p14="http://schemas.microsoft.com/office/powerpoint/2010/main" val="3754162676"/>
+      </p:ext>
+    </p:extLst>
+  </p:cSld>
+  <p:clrMapOvr>
+    <a:masterClrMapping/>
+  </p:clrMapOvr>
+</p:sld>
+</file>
+
+<file path=ppt/slides/slide18.xml><?xml version="1.0" encoding="utf-8"?>
 <p:sld xmlns:a="http://schemas.openxmlformats.org/drawingml/2006/main" xmlns:r="http://schemas.openxmlformats.org/officeDocument/2006/relationships" xmlns:p="http://schemas.openxmlformats.org/presentationml/2006/main">
   <p:cSld>
     <p:spTree>
@@ -5106,7 +5846,7 @@
 </p:sld>
 </file>
 
-<file path=ppt/slides/slide17.xml><?xml version="1.0" encoding="utf-8"?>
+<file path=ppt/slides/slide19.xml><?xml version="1.0" encoding="utf-8"?>
 <p:sld xmlns:a="http://schemas.openxmlformats.org/drawingml/2006/main" xmlns:r="http://schemas.openxmlformats.org/officeDocument/2006/relationships" xmlns:p="http://schemas.openxmlformats.org/presentationml/2006/main">
   <p:cSld>
     <p:spTree>
@@ -5384,510 +6124,6 @@
     <p:extLst>
       <p:ext uri="{BB962C8B-B14F-4D97-AF65-F5344CB8AC3E}">
         <p14:creationId xmlns:p14="http://schemas.microsoft.com/office/powerpoint/2010/main" val="4111398974"/>
-      </p:ext>
-    </p:extLst>
-  </p:cSld>
-  <p:clrMapOvr>
-    <a:masterClrMapping/>
-  </p:clrMapOvr>
-</p:sld>
-</file>
-
-<file path=ppt/slides/slide18.xml><?xml version="1.0" encoding="utf-8"?>
-<p:sld xmlns:a="http://schemas.openxmlformats.org/drawingml/2006/main" xmlns:r="http://schemas.openxmlformats.org/officeDocument/2006/relationships" xmlns:p="http://schemas.openxmlformats.org/presentationml/2006/main">
-  <p:cSld>
-    <p:spTree>
-      <p:nvGrpSpPr>
-        <p:cNvPr id="1" name=""/>
-        <p:cNvGrpSpPr/>
-        <p:nvPr/>
-      </p:nvGrpSpPr>
-      <p:grpSpPr>
-        <a:xfrm>
-          <a:off x="0" y="0"/>
-          <a:ext cx="0" cy="0"/>
-          <a:chOff x="0" y="0"/>
-          <a:chExt cx="0" cy="0"/>
-        </a:xfrm>
-      </p:grpSpPr>
-      <p:sp>
-        <p:nvSpPr>
-          <p:cNvPr id="3" name="TextBox 2">
-            <a:extLst>
-              <a:ext uri="{FF2B5EF4-FFF2-40B4-BE49-F238E27FC236}">
-                <a16:creationId xmlns:a16="http://schemas.microsoft.com/office/drawing/2014/main" id="{02F679E0-9BF9-CF47-8222-F225C2E1FAA2}"/>
-              </a:ext>
-            </a:extLst>
-          </p:cNvPr>
-          <p:cNvSpPr txBox="1"/>
-          <p:nvPr/>
-        </p:nvSpPr>
-        <p:spPr>
-          <a:xfrm>
-            <a:off x="2280857" y="416452"/>
-            <a:ext cx="7630286" cy="523220"/>
-          </a:xfrm>
-          <a:prstGeom prst="rect">
-            <a:avLst/>
-          </a:prstGeom>
-          <a:noFill/>
-        </p:spPr>
-        <p:txBody>
-          <a:bodyPr wrap="square" rtlCol="0">
-            <a:spAutoFit/>
-          </a:bodyPr>
-          <a:lstStyle/>
-          <a:p>
-            <a:pPr algn="ctr"/>
-            <a:r>
-              <a:rPr lang="en-US" sz="2800" b="1" dirty="0">
-                <a:solidFill>
-                  <a:srgbClr val="000090"/>
-                </a:solidFill>
-              </a:rPr>
-              <a:t>Principal Strains</a:t>
-            </a:r>
-            <a:endParaRPr lang="en-US" sz="2800" b="1" dirty="0">
-              <a:solidFill>
-                <a:srgbClr val="008000"/>
-              </a:solidFill>
-            </a:endParaRPr>
-          </a:p>
-        </p:txBody>
-      </p:sp>
-      <p:pic>
-        <p:nvPicPr>
-          <p:cNvPr id="5" name="Picture 4">
-            <a:extLst>
-              <a:ext uri="{FF2B5EF4-FFF2-40B4-BE49-F238E27FC236}">
-                <a16:creationId xmlns:a16="http://schemas.microsoft.com/office/drawing/2014/main" id="{FFC1B817-4859-3D41-81C5-17691B92D00E}"/>
-              </a:ext>
-            </a:extLst>
-          </p:cNvPr>
-          <p:cNvPicPr>
-            <a:picLocks noChangeAspect="1"/>
-          </p:cNvPicPr>
-          <p:nvPr/>
-        </p:nvPicPr>
-        <p:blipFill>
-          <a:blip r:embed="rId2"/>
-          <a:stretch>
-            <a:fillRect/>
-          </a:stretch>
-        </p:blipFill>
-        <p:spPr>
-          <a:xfrm>
-            <a:off x="1793411" y="1565375"/>
-            <a:ext cx="8242300" cy="520700"/>
-          </a:xfrm>
-          <a:prstGeom prst="rect">
-            <a:avLst/>
-          </a:prstGeom>
-        </p:spPr>
-      </p:pic>
-      <p:pic>
-        <p:nvPicPr>
-          <p:cNvPr id="6" name="Picture 5">
-            <a:extLst>
-              <a:ext uri="{FF2B5EF4-FFF2-40B4-BE49-F238E27FC236}">
-                <a16:creationId xmlns:a16="http://schemas.microsoft.com/office/drawing/2014/main" id="{00D530FA-71DB-6A40-A4C8-A5DB4A10A70F}"/>
-              </a:ext>
-            </a:extLst>
-          </p:cNvPr>
-          <p:cNvPicPr>
-            <a:picLocks noChangeAspect="1"/>
-          </p:cNvPicPr>
-          <p:nvPr/>
-        </p:nvPicPr>
-        <p:blipFill>
-          <a:blip r:embed="rId3"/>
-          <a:stretch>
-            <a:fillRect/>
-          </a:stretch>
-        </p:blipFill>
-        <p:spPr>
-          <a:xfrm>
-            <a:off x="1793411" y="2238505"/>
-            <a:ext cx="8242300" cy="520700"/>
-          </a:xfrm>
-          <a:prstGeom prst="rect">
-            <a:avLst/>
-          </a:prstGeom>
-        </p:spPr>
-      </p:pic>
-      <p:pic>
-        <p:nvPicPr>
-          <p:cNvPr id="7" name="Picture 6">
-            <a:extLst>
-              <a:ext uri="{FF2B5EF4-FFF2-40B4-BE49-F238E27FC236}">
-                <a16:creationId xmlns:a16="http://schemas.microsoft.com/office/drawing/2014/main" id="{4B69C2C5-D19B-5B40-9767-E713F9364DCE}"/>
-              </a:ext>
-            </a:extLst>
-          </p:cNvPr>
-          <p:cNvPicPr>
-            <a:picLocks noChangeAspect="1"/>
-          </p:cNvPicPr>
-          <p:nvPr/>
-        </p:nvPicPr>
-        <p:blipFill>
-          <a:blip r:embed="rId4"/>
-          <a:stretch>
-            <a:fillRect/>
-          </a:stretch>
-        </p:blipFill>
-        <p:spPr>
-          <a:xfrm>
-            <a:off x="1793411" y="2908300"/>
-            <a:ext cx="9550400" cy="520700"/>
-          </a:xfrm>
-          <a:prstGeom prst="rect">
-            <a:avLst/>
-          </a:prstGeom>
-        </p:spPr>
-      </p:pic>
-      <p:sp>
-        <p:nvSpPr>
-          <p:cNvPr id="8" name="TextBox 7">
-            <a:extLst>
-              <a:ext uri="{FF2B5EF4-FFF2-40B4-BE49-F238E27FC236}">
-                <a16:creationId xmlns:a16="http://schemas.microsoft.com/office/drawing/2014/main" id="{FA636AC9-4003-AD48-8AAC-071DB6B4FD36}"/>
-              </a:ext>
-            </a:extLst>
-          </p:cNvPr>
-          <p:cNvSpPr txBox="1"/>
-          <p:nvPr/>
-        </p:nvSpPr>
-        <p:spPr>
-          <a:xfrm>
-            <a:off x="780837" y="4035781"/>
-            <a:ext cx="11382628" cy="430887"/>
-          </a:xfrm>
-          <a:prstGeom prst="rect">
-            <a:avLst/>
-          </a:prstGeom>
-          <a:noFill/>
-        </p:spPr>
-        <p:txBody>
-          <a:bodyPr wrap="square" rtlCol="0">
-            <a:spAutoFit/>
-          </a:bodyPr>
-          <a:lstStyle/>
-          <a:p>
-            <a:r>
-              <a:rPr lang="en-US" sz="2200" dirty="0"/>
-              <a:t>Find the rotation angle that makes shear strain 0 and then what are the other components?</a:t>
-            </a:r>
-          </a:p>
-        </p:txBody>
-      </p:sp>
-      <p:sp>
-        <p:nvSpPr>
-          <p:cNvPr id="9" name="TextBox 8">
-            <a:extLst>
-              <a:ext uri="{FF2B5EF4-FFF2-40B4-BE49-F238E27FC236}">
-                <a16:creationId xmlns:a16="http://schemas.microsoft.com/office/drawing/2014/main" id="{FB6933C1-428B-074A-AFD9-F8C0873D8E8F}"/>
-              </a:ext>
-            </a:extLst>
-          </p:cNvPr>
-          <p:cNvSpPr txBox="1"/>
-          <p:nvPr/>
-        </p:nvSpPr>
-        <p:spPr>
-          <a:xfrm>
-            <a:off x="7319196" y="1631724"/>
-            <a:ext cx="324778" cy="430887"/>
-          </a:xfrm>
-          <a:prstGeom prst="rect">
-            <a:avLst/>
-          </a:prstGeom>
-          <a:noFill/>
-        </p:spPr>
-        <p:txBody>
-          <a:bodyPr wrap="square" rtlCol="0">
-            <a:spAutoFit/>
-          </a:bodyPr>
-          <a:lstStyle/>
-          <a:p>
-            <a:r>
-              <a:rPr lang="en-US" sz="2200" dirty="0"/>
-              <a:t>2</a:t>
-            </a:r>
-          </a:p>
-        </p:txBody>
-      </p:sp>
-      <p:sp>
-        <p:nvSpPr>
-          <p:cNvPr id="10" name="TextBox 9">
-            <a:extLst>
-              <a:ext uri="{FF2B5EF4-FFF2-40B4-BE49-F238E27FC236}">
-                <a16:creationId xmlns:a16="http://schemas.microsoft.com/office/drawing/2014/main" id="{7BD83263-E0FA-F247-B656-B557768EA60D}"/>
-              </a:ext>
-            </a:extLst>
-          </p:cNvPr>
-          <p:cNvSpPr txBox="1"/>
-          <p:nvPr/>
-        </p:nvSpPr>
-        <p:spPr>
-          <a:xfrm>
-            <a:off x="7319196" y="2328318"/>
-            <a:ext cx="324778" cy="430887"/>
-          </a:xfrm>
-          <a:prstGeom prst="rect">
-            <a:avLst/>
-          </a:prstGeom>
-          <a:noFill/>
-        </p:spPr>
-        <p:txBody>
-          <a:bodyPr wrap="square" rtlCol="0">
-            <a:spAutoFit/>
-          </a:bodyPr>
-          <a:lstStyle/>
-          <a:p>
-            <a:r>
-              <a:rPr lang="en-US" sz="2200" dirty="0"/>
-              <a:t>2</a:t>
-            </a:r>
-          </a:p>
-        </p:txBody>
-      </p:sp>
-      <p:sp>
-        <p:nvSpPr>
-          <p:cNvPr id="13" name="TextBox 12">
-            <a:extLst>
-              <a:ext uri="{FF2B5EF4-FFF2-40B4-BE49-F238E27FC236}">
-                <a16:creationId xmlns:a16="http://schemas.microsoft.com/office/drawing/2014/main" id="{72E54C95-EB0E-824B-8652-C1A795665C8C}"/>
-              </a:ext>
-            </a:extLst>
-          </p:cNvPr>
-          <p:cNvSpPr txBox="1"/>
-          <p:nvPr/>
-        </p:nvSpPr>
-        <p:spPr>
-          <a:xfrm>
-            <a:off x="780837" y="4907070"/>
-            <a:ext cx="7841468" cy="430887"/>
-          </a:xfrm>
-          <a:prstGeom prst="rect">
-            <a:avLst/>
-          </a:prstGeom>
-          <a:noFill/>
-        </p:spPr>
-        <p:txBody>
-          <a:bodyPr wrap="square" rtlCol="0">
-            <a:spAutoFit/>
-          </a:bodyPr>
-          <a:lstStyle/>
-          <a:p>
-            <a:r>
-              <a:rPr lang="en-US" sz="2200" dirty="0"/>
-              <a:t>What is the maximum shear strain for this system?</a:t>
-            </a:r>
-          </a:p>
-        </p:txBody>
-      </p:sp>
-      <p:sp>
-        <p:nvSpPr>
-          <p:cNvPr id="12" name="TextBox 11">
-            <a:extLst>
-              <a:ext uri="{FF2B5EF4-FFF2-40B4-BE49-F238E27FC236}">
-                <a16:creationId xmlns:a16="http://schemas.microsoft.com/office/drawing/2014/main" id="{79399A38-308E-2743-B0D7-9F41EEAA6116}"/>
-              </a:ext>
-            </a:extLst>
-          </p:cNvPr>
-          <p:cNvSpPr txBox="1"/>
-          <p:nvPr/>
-        </p:nvSpPr>
-        <p:spPr>
-          <a:xfrm>
-            <a:off x="2889323" y="2981844"/>
-            <a:ext cx="324778" cy="430887"/>
-          </a:xfrm>
-          <a:prstGeom prst="rect">
-            <a:avLst/>
-          </a:prstGeom>
-          <a:solidFill>
-            <a:schemeClr val="bg1"/>
-          </a:solidFill>
-        </p:spPr>
-        <p:txBody>
-          <a:bodyPr wrap="square" rtlCol="0">
-            <a:spAutoFit/>
-          </a:bodyPr>
-          <a:lstStyle/>
-          <a:p>
-            <a:endParaRPr lang="en-US" sz="2200" dirty="0"/>
-          </a:p>
-        </p:txBody>
-      </p:sp>
-    </p:spTree>
-    <p:extLst>
-      <p:ext uri="{BB962C8B-B14F-4D97-AF65-F5344CB8AC3E}">
-        <p14:creationId xmlns:p14="http://schemas.microsoft.com/office/powerpoint/2010/main" val="3161968123"/>
-      </p:ext>
-    </p:extLst>
-  </p:cSld>
-  <p:clrMapOvr>
-    <a:masterClrMapping/>
-  </p:clrMapOvr>
-</p:sld>
-</file>
-
-<file path=ppt/slides/slide19.xml><?xml version="1.0" encoding="utf-8"?>
-<p:sld xmlns:a="http://schemas.openxmlformats.org/drawingml/2006/main" xmlns:r="http://schemas.openxmlformats.org/officeDocument/2006/relationships" xmlns:p="http://schemas.openxmlformats.org/presentationml/2006/main">
-  <p:cSld>
-    <p:spTree>
-      <p:nvGrpSpPr>
-        <p:cNvPr id="1" name=""/>
-        <p:cNvGrpSpPr/>
-        <p:nvPr/>
-      </p:nvGrpSpPr>
-      <p:grpSpPr>
-        <a:xfrm>
-          <a:off x="0" y="0"/>
-          <a:ext cx="0" cy="0"/>
-          <a:chOff x="0" y="0"/>
-          <a:chExt cx="0" cy="0"/>
-        </a:xfrm>
-      </p:grpSpPr>
-      <p:sp>
-        <p:nvSpPr>
-          <p:cNvPr id="3" name="TextBox 2">
-            <a:extLst>
-              <a:ext uri="{FF2B5EF4-FFF2-40B4-BE49-F238E27FC236}">
-                <a16:creationId xmlns:a16="http://schemas.microsoft.com/office/drawing/2014/main" id="{E5ECC84A-2048-7A4E-894F-D7B3CE827C35}"/>
-              </a:ext>
-            </a:extLst>
-          </p:cNvPr>
-          <p:cNvSpPr txBox="1"/>
-          <p:nvPr/>
-        </p:nvSpPr>
-        <p:spPr>
-          <a:xfrm>
-            <a:off x="2280857" y="416452"/>
-            <a:ext cx="7630286" cy="523220"/>
-          </a:xfrm>
-          <a:prstGeom prst="rect">
-            <a:avLst/>
-          </a:prstGeom>
-          <a:noFill/>
-        </p:spPr>
-        <p:txBody>
-          <a:bodyPr wrap="square" rtlCol="0">
-            <a:spAutoFit/>
-          </a:bodyPr>
-          <a:lstStyle/>
-          <a:p>
-            <a:pPr algn="ctr"/>
-            <a:r>
-              <a:rPr lang="en-US" sz="2800" b="1" dirty="0">
-                <a:solidFill>
-                  <a:srgbClr val="000090"/>
-                </a:solidFill>
-              </a:rPr>
-              <a:t>Strain invariants</a:t>
-            </a:r>
-            <a:endParaRPr lang="en-US" sz="2800" b="1" dirty="0">
-              <a:solidFill>
-                <a:srgbClr val="008000"/>
-              </a:solidFill>
-            </a:endParaRPr>
-          </a:p>
-        </p:txBody>
-      </p:sp>
-      <p:pic>
-        <p:nvPicPr>
-          <p:cNvPr id="2" name="Picture 1">
-            <a:extLst>
-              <a:ext uri="{FF2B5EF4-FFF2-40B4-BE49-F238E27FC236}">
-                <a16:creationId xmlns:a16="http://schemas.microsoft.com/office/drawing/2014/main" id="{CE99E35E-6D9D-794B-8B6C-C878A8CCCB86}"/>
-              </a:ext>
-            </a:extLst>
-          </p:cNvPr>
-          <p:cNvPicPr>
-            <a:picLocks noChangeAspect="1"/>
-          </p:cNvPicPr>
-          <p:nvPr/>
-        </p:nvPicPr>
-        <p:blipFill>
-          <a:blip r:embed="rId2"/>
-          <a:stretch>
-            <a:fillRect/>
-          </a:stretch>
-        </p:blipFill>
-        <p:spPr>
-          <a:xfrm>
-            <a:off x="4992741" y="1815215"/>
-            <a:ext cx="1816100" cy="469900"/>
-          </a:xfrm>
-          <a:prstGeom prst="rect">
-            <a:avLst/>
-          </a:prstGeom>
-        </p:spPr>
-      </p:pic>
-      <p:pic>
-        <p:nvPicPr>
-          <p:cNvPr id="5" name="Picture 4">
-            <a:extLst>
-              <a:ext uri="{FF2B5EF4-FFF2-40B4-BE49-F238E27FC236}">
-                <a16:creationId xmlns:a16="http://schemas.microsoft.com/office/drawing/2014/main" id="{D479BE2C-A641-CF4B-ADF3-C3FF9FECA15F}"/>
-              </a:ext>
-            </a:extLst>
-          </p:cNvPr>
-          <p:cNvPicPr>
-            <a:picLocks noChangeAspect="1"/>
-          </p:cNvPicPr>
-          <p:nvPr/>
-        </p:nvPicPr>
-        <p:blipFill>
-          <a:blip r:embed="rId3"/>
-          <a:stretch>
-            <a:fillRect/>
-          </a:stretch>
-        </p:blipFill>
-        <p:spPr>
-          <a:xfrm>
-            <a:off x="3740150" y="2690758"/>
-            <a:ext cx="4711700" cy="939800"/>
-          </a:xfrm>
-          <a:prstGeom prst="rect">
-            <a:avLst/>
-          </a:prstGeom>
-        </p:spPr>
-      </p:pic>
-      <p:pic>
-        <p:nvPicPr>
-          <p:cNvPr id="6" name="Picture 5">
-            <a:extLst>
-              <a:ext uri="{FF2B5EF4-FFF2-40B4-BE49-F238E27FC236}">
-                <a16:creationId xmlns:a16="http://schemas.microsoft.com/office/drawing/2014/main" id="{DCC542E2-230A-3F4D-BE4A-E4C7A5AF897F}"/>
-              </a:ext>
-            </a:extLst>
-          </p:cNvPr>
-          <p:cNvPicPr>
-            <a:picLocks noChangeAspect="1"/>
-          </p:cNvPicPr>
-          <p:nvPr/>
-        </p:nvPicPr>
-        <p:blipFill>
-          <a:blip r:embed="rId4"/>
-          <a:stretch>
-            <a:fillRect/>
-          </a:stretch>
-        </p:blipFill>
-        <p:spPr>
-          <a:xfrm>
-            <a:off x="5048250" y="4036201"/>
-            <a:ext cx="2095500" cy="469900"/>
-          </a:xfrm>
-          <a:prstGeom prst="rect">
-            <a:avLst/>
-          </a:prstGeom>
-        </p:spPr>
-      </p:pic>
-    </p:spTree>
-    <p:extLst>
-      <p:ext uri="{BB962C8B-B14F-4D97-AF65-F5344CB8AC3E}">
-        <p14:creationId xmlns:p14="http://schemas.microsoft.com/office/powerpoint/2010/main" val="832299620"/>
       </p:ext>
     </p:extLst>
   </p:cSld>
@@ -6458,6 +6694,510 @@
           <p:cNvPr id="3" name="TextBox 2">
             <a:extLst>
               <a:ext uri="{FF2B5EF4-FFF2-40B4-BE49-F238E27FC236}">
+                <a16:creationId xmlns:a16="http://schemas.microsoft.com/office/drawing/2014/main" id="{02F679E0-9BF9-CF47-8222-F225C2E1FAA2}"/>
+              </a:ext>
+            </a:extLst>
+          </p:cNvPr>
+          <p:cNvSpPr txBox="1"/>
+          <p:nvPr/>
+        </p:nvSpPr>
+        <p:spPr>
+          <a:xfrm>
+            <a:off x="2280857" y="416452"/>
+            <a:ext cx="7630286" cy="523220"/>
+          </a:xfrm>
+          <a:prstGeom prst="rect">
+            <a:avLst/>
+          </a:prstGeom>
+          <a:noFill/>
+        </p:spPr>
+        <p:txBody>
+          <a:bodyPr wrap="square" rtlCol="0">
+            <a:spAutoFit/>
+          </a:bodyPr>
+          <a:lstStyle/>
+          <a:p>
+            <a:pPr algn="ctr"/>
+            <a:r>
+              <a:rPr lang="en-US" sz="2800" b="1" dirty="0">
+                <a:solidFill>
+                  <a:srgbClr val="000090"/>
+                </a:solidFill>
+              </a:rPr>
+              <a:t>Principal Strains</a:t>
+            </a:r>
+            <a:endParaRPr lang="en-US" sz="2800" b="1" dirty="0">
+              <a:solidFill>
+                <a:srgbClr val="008000"/>
+              </a:solidFill>
+            </a:endParaRPr>
+          </a:p>
+        </p:txBody>
+      </p:sp>
+      <p:pic>
+        <p:nvPicPr>
+          <p:cNvPr id="5" name="Picture 4">
+            <a:extLst>
+              <a:ext uri="{FF2B5EF4-FFF2-40B4-BE49-F238E27FC236}">
+                <a16:creationId xmlns:a16="http://schemas.microsoft.com/office/drawing/2014/main" id="{FFC1B817-4859-3D41-81C5-17691B92D00E}"/>
+              </a:ext>
+            </a:extLst>
+          </p:cNvPr>
+          <p:cNvPicPr>
+            <a:picLocks noChangeAspect="1"/>
+          </p:cNvPicPr>
+          <p:nvPr/>
+        </p:nvPicPr>
+        <p:blipFill>
+          <a:blip r:embed="rId2"/>
+          <a:stretch>
+            <a:fillRect/>
+          </a:stretch>
+        </p:blipFill>
+        <p:spPr>
+          <a:xfrm>
+            <a:off x="1793411" y="1565375"/>
+            <a:ext cx="8242300" cy="520700"/>
+          </a:xfrm>
+          <a:prstGeom prst="rect">
+            <a:avLst/>
+          </a:prstGeom>
+        </p:spPr>
+      </p:pic>
+      <p:pic>
+        <p:nvPicPr>
+          <p:cNvPr id="6" name="Picture 5">
+            <a:extLst>
+              <a:ext uri="{FF2B5EF4-FFF2-40B4-BE49-F238E27FC236}">
+                <a16:creationId xmlns:a16="http://schemas.microsoft.com/office/drawing/2014/main" id="{00D530FA-71DB-6A40-A4C8-A5DB4A10A70F}"/>
+              </a:ext>
+            </a:extLst>
+          </p:cNvPr>
+          <p:cNvPicPr>
+            <a:picLocks noChangeAspect="1"/>
+          </p:cNvPicPr>
+          <p:nvPr/>
+        </p:nvPicPr>
+        <p:blipFill>
+          <a:blip r:embed="rId3"/>
+          <a:stretch>
+            <a:fillRect/>
+          </a:stretch>
+        </p:blipFill>
+        <p:spPr>
+          <a:xfrm>
+            <a:off x="1793411" y="2238505"/>
+            <a:ext cx="8242300" cy="520700"/>
+          </a:xfrm>
+          <a:prstGeom prst="rect">
+            <a:avLst/>
+          </a:prstGeom>
+        </p:spPr>
+      </p:pic>
+      <p:pic>
+        <p:nvPicPr>
+          <p:cNvPr id="7" name="Picture 6">
+            <a:extLst>
+              <a:ext uri="{FF2B5EF4-FFF2-40B4-BE49-F238E27FC236}">
+                <a16:creationId xmlns:a16="http://schemas.microsoft.com/office/drawing/2014/main" id="{4B69C2C5-D19B-5B40-9767-E713F9364DCE}"/>
+              </a:ext>
+            </a:extLst>
+          </p:cNvPr>
+          <p:cNvPicPr>
+            <a:picLocks noChangeAspect="1"/>
+          </p:cNvPicPr>
+          <p:nvPr/>
+        </p:nvPicPr>
+        <p:blipFill>
+          <a:blip r:embed="rId4"/>
+          <a:stretch>
+            <a:fillRect/>
+          </a:stretch>
+        </p:blipFill>
+        <p:spPr>
+          <a:xfrm>
+            <a:off x="1793411" y="2908300"/>
+            <a:ext cx="9550400" cy="520700"/>
+          </a:xfrm>
+          <a:prstGeom prst="rect">
+            <a:avLst/>
+          </a:prstGeom>
+        </p:spPr>
+      </p:pic>
+      <p:sp>
+        <p:nvSpPr>
+          <p:cNvPr id="8" name="TextBox 7">
+            <a:extLst>
+              <a:ext uri="{FF2B5EF4-FFF2-40B4-BE49-F238E27FC236}">
+                <a16:creationId xmlns:a16="http://schemas.microsoft.com/office/drawing/2014/main" id="{FA636AC9-4003-AD48-8AAC-071DB6B4FD36}"/>
+              </a:ext>
+            </a:extLst>
+          </p:cNvPr>
+          <p:cNvSpPr txBox="1"/>
+          <p:nvPr/>
+        </p:nvSpPr>
+        <p:spPr>
+          <a:xfrm>
+            <a:off x="780837" y="4035781"/>
+            <a:ext cx="11382628" cy="430887"/>
+          </a:xfrm>
+          <a:prstGeom prst="rect">
+            <a:avLst/>
+          </a:prstGeom>
+          <a:noFill/>
+        </p:spPr>
+        <p:txBody>
+          <a:bodyPr wrap="square" rtlCol="0">
+            <a:spAutoFit/>
+          </a:bodyPr>
+          <a:lstStyle/>
+          <a:p>
+            <a:r>
+              <a:rPr lang="en-US" sz="2200" dirty="0"/>
+              <a:t>Find the rotation angle that makes shear strain 0 and then what are the other components?</a:t>
+            </a:r>
+          </a:p>
+        </p:txBody>
+      </p:sp>
+      <p:sp>
+        <p:nvSpPr>
+          <p:cNvPr id="9" name="TextBox 8">
+            <a:extLst>
+              <a:ext uri="{FF2B5EF4-FFF2-40B4-BE49-F238E27FC236}">
+                <a16:creationId xmlns:a16="http://schemas.microsoft.com/office/drawing/2014/main" id="{FB6933C1-428B-074A-AFD9-F8C0873D8E8F}"/>
+              </a:ext>
+            </a:extLst>
+          </p:cNvPr>
+          <p:cNvSpPr txBox="1"/>
+          <p:nvPr/>
+        </p:nvSpPr>
+        <p:spPr>
+          <a:xfrm>
+            <a:off x="7319196" y="1631724"/>
+            <a:ext cx="324778" cy="430887"/>
+          </a:xfrm>
+          <a:prstGeom prst="rect">
+            <a:avLst/>
+          </a:prstGeom>
+          <a:noFill/>
+        </p:spPr>
+        <p:txBody>
+          <a:bodyPr wrap="square" rtlCol="0">
+            <a:spAutoFit/>
+          </a:bodyPr>
+          <a:lstStyle/>
+          <a:p>
+            <a:r>
+              <a:rPr lang="en-US" sz="2200" dirty="0"/>
+              <a:t>2</a:t>
+            </a:r>
+          </a:p>
+        </p:txBody>
+      </p:sp>
+      <p:sp>
+        <p:nvSpPr>
+          <p:cNvPr id="10" name="TextBox 9">
+            <a:extLst>
+              <a:ext uri="{FF2B5EF4-FFF2-40B4-BE49-F238E27FC236}">
+                <a16:creationId xmlns:a16="http://schemas.microsoft.com/office/drawing/2014/main" id="{7BD83263-E0FA-F247-B656-B557768EA60D}"/>
+              </a:ext>
+            </a:extLst>
+          </p:cNvPr>
+          <p:cNvSpPr txBox="1"/>
+          <p:nvPr/>
+        </p:nvSpPr>
+        <p:spPr>
+          <a:xfrm>
+            <a:off x="7319196" y="2328318"/>
+            <a:ext cx="324778" cy="430887"/>
+          </a:xfrm>
+          <a:prstGeom prst="rect">
+            <a:avLst/>
+          </a:prstGeom>
+          <a:noFill/>
+        </p:spPr>
+        <p:txBody>
+          <a:bodyPr wrap="square" rtlCol="0">
+            <a:spAutoFit/>
+          </a:bodyPr>
+          <a:lstStyle/>
+          <a:p>
+            <a:r>
+              <a:rPr lang="en-US" sz="2200" dirty="0"/>
+              <a:t>2</a:t>
+            </a:r>
+          </a:p>
+        </p:txBody>
+      </p:sp>
+      <p:sp>
+        <p:nvSpPr>
+          <p:cNvPr id="13" name="TextBox 12">
+            <a:extLst>
+              <a:ext uri="{FF2B5EF4-FFF2-40B4-BE49-F238E27FC236}">
+                <a16:creationId xmlns:a16="http://schemas.microsoft.com/office/drawing/2014/main" id="{72E54C95-EB0E-824B-8652-C1A795665C8C}"/>
+              </a:ext>
+            </a:extLst>
+          </p:cNvPr>
+          <p:cNvSpPr txBox="1"/>
+          <p:nvPr/>
+        </p:nvSpPr>
+        <p:spPr>
+          <a:xfrm>
+            <a:off x="780837" y="4907070"/>
+            <a:ext cx="7841468" cy="430887"/>
+          </a:xfrm>
+          <a:prstGeom prst="rect">
+            <a:avLst/>
+          </a:prstGeom>
+          <a:noFill/>
+        </p:spPr>
+        <p:txBody>
+          <a:bodyPr wrap="square" rtlCol="0">
+            <a:spAutoFit/>
+          </a:bodyPr>
+          <a:lstStyle/>
+          <a:p>
+            <a:r>
+              <a:rPr lang="en-US" sz="2200" dirty="0"/>
+              <a:t>What is the maximum shear strain for this system?</a:t>
+            </a:r>
+          </a:p>
+        </p:txBody>
+      </p:sp>
+      <p:sp>
+        <p:nvSpPr>
+          <p:cNvPr id="12" name="TextBox 11">
+            <a:extLst>
+              <a:ext uri="{FF2B5EF4-FFF2-40B4-BE49-F238E27FC236}">
+                <a16:creationId xmlns:a16="http://schemas.microsoft.com/office/drawing/2014/main" id="{79399A38-308E-2743-B0D7-9F41EEAA6116}"/>
+              </a:ext>
+            </a:extLst>
+          </p:cNvPr>
+          <p:cNvSpPr txBox="1"/>
+          <p:nvPr/>
+        </p:nvSpPr>
+        <p:spPr>
+          <a:xfrm>
+            <a:off x="2889323" y="2981844"/>
+            <a:ext cx="324778" cy="430887"/>
+          </a:xfrm>
+          <a:prstGeom prst="rect">
+            <a:avLst/>
+          </a:prstGeom>
+          <a:solidFill>
+            <a:schemeClr val="bg1"/>
+          </a:solidFill>
+        </p:spPr>
+        <p:txBody>
+          <a:bodyPr wrap="square" rtlCol="0">
+            <a:spAutoFit/>
+          </a:bodyPr>
+          <a:lstStyle/>
+          <a:p>
+            <a:endParaRPr lang="en-US" sz="2200" dirty="0"/>
+          </a:p>
+        </p:txBody>
+      </p:sp>
+    </p:spTree>
+    <p:extLst>
+      <p:ext uri="{BB962C8B-B14F-4D97-AF65-F5344CB8AC3E}">
+        <p14:creationId xmlns:p14="http://schemas.microsoft.com/office/powerpoint/2010/main" val="3161968123"/>
+      </p:ext>
+    </p:extLst>
+  </p:cSld>
+  <p:clrMapOvr>
+    <a:masterClrMapping/>
+  </p:clrMapOvr>
+</p:sld>
+</file>
+
+<file path=ppt/slides/slide21.xml><?xml version="1.0" encoding="utf-8"?>
+<p:sld xmlns:a="http://schemas.openxmlformats.org/drawingml/2006/main" xmlns:r="http://schemas.openxmlformats.org/officeDocument/2006/relationships" xmlns:p="http://schemas.openxmlformats.org/presentationml/2006/main">
+  <p:cSld>
+    <p:spTree>
+      <p:nvGrpSpPr>
+        <p:cNvPr id="1" name=""/>
+        <p:cNvGrpSpPr/>
+        <p:nvPr/>
+      </p:nvGrpSpPr>
+      <p:grpSpPr>
+        <a:xfrm>
+          <a:off x="0" y="0"/>
+          <a:ext cx="0" cy="0"/>
+          <a:chOff x="0" y="0"/>
+          <a:chExt cx="0" cy="0"/>
+        </a:xfrm>
+      </p:grpSpPr>
+      <p:sp>
+        <p:nvSpPr>
+          <p:cNvPr id="3" name="TextBox 2">
+            <a:extLst>
+              <a:ext uri="{FF2B5EF4-FFF2-40B4-BE49-F238E27FC236}">
+                <a16:creationId xmlns:a16="http://schemas.microsoft.com/office/drawing/2014/main" id="{E5ECC84A-2048-7A4E-894F-D7B3CE827C35}"/>
+              </a:ext>
+            </a:extLst>
+          </p:cNvPr>
+          <p:cNvSpPr txBox="1"/>
+          <p:nvPr/>
+        </p:nvSpPr>
+        <p:spPr>
+          <a:xfrm>
+            <a:off x="2280857" y="416452"/>
+            <a:ext cx="7630286" cy="523220"/>
+          </a:xfrm>
+          <a:prstGeom prst="rect">
+            <a:avLst/>
+          </a:prstGeom>
+          <a:noFill/>
+        </p:spPr>
+        <p:txBody>
+          <a:bodyPr wrap="square" rtlCol="0">
+            <a:spAutoFit/>
+          </a:bodyPr>
+          <a:lstStyle/>
+          <a:p>
+            <a:pPr algn="ctr"/>
+            <a:r>
+              <a:rPr lang="en-US" sz="2800" b="1" dirty="0">
+                <a:solidFill>
+                  <a:srgbClr val="000090"/>
+                </a:solidFill>
+              </a:rPr>
+              <a:t>Strain invariants</a:t>
+            </a:r>
+            <a:endParaRPr lang="en-US" sz="2800" b="1" dirty="0">
+              <a:solidFill>
+                <a:srgbClr val="008000"/>
+              </a:solidFill>
+            </a:endParaRPr>
+          </a:p>
+        </p:txBody>
+      </p:sp>
+      <p:pic>
+        <p:nvPicPr>
+          <p:cNvPr id="2" name="Picture 1">
+            <a:extLst>
+              <a:ext uri="{FF2B5EF4-FFF2-40B4-BE49-F238E27FC236}">
+                <a16:creationId xmlns:a16="http://schemas.microsoft.com/office/drawing/2014/main" id="{CE99E35E-6D9D-794B-8B6C-C878A8CCCB86}"/>
+              </a:ext>
+            </a:extLst>
+          </p:cNvPr>
+          <p:cNvPicPr>
+            <a:picLocks noChangeAspect="1"/>
+          </p:cNvPicPr>
+          <p:nvPr/>
+        </p:nvPicPr>
+        <p:blipFill>
+          <a:blip r:embed="rId2"/>
+          <a:stretch>
+            <a:fillRect/>
+          </a:stretch>
+        </p:blipFill>
+        <p:spPr>
+          <a:xfrm>
+            <a:off x="4992741" y="1815215"/>
+            <a:ext cx="1816100" cy="469900"/>
+          </a:xfrm>
+          <a:prstGeom prst="rect">
+            <a:avLst/>
+          </a:prstGeom>
+        </p:spPr>
+      </p:pic>
+      <p:pic>
+        <p:nvPicPr>
+          <p:cNvPr id="5" name="Picture 4">
+            <a:extLst>
+              <a:ext uri="{FF2B5EF4-FFF2-40B4-BE49-F238E27FC236}">
+                <a16:creationId xmlns:a16="http://schemas.microsoft.com/office/drawing/2014/main" id="{D479BE2C-A641-CF4B-ADF3-C3FF9FECA15F}"/>
+              </a:ext>
+            </a:extLst>
+          </p:cNvPr>
+          <p:cNvPicPr>
+            <a:picLocks noChangeAspect="1"/>
+          </p:cNvPicPr>
+          <p:nvPr/>
+        </p:nvPicPr>
+        <p:blipFill>
+          <a:blip r:embed="rId3"/>
+          <a:stretch>
+            <a:fillRect/>
+          </a:stretch>
+        </p:blipFill>
+        <p:spPr>
+          <a:xfrm>
+            <a:off x="3740150" y="2690758"/>
+            <a:ext cx="4711700" cy="939800"/>
+          </a:xfrm>
+          <a:prstGeom prst="rect">
+            <a:avLst/>
+          </a:prstGeom>
+        </p:spPr>
+      </p:pic>
+      <p:pic>
+        <p:nvPicPr>
+          <p:cNvPr id="6" name="Picture 5">
+            <a:extLst>
+              <a:ext uri="{FF2B5EF4-FFF2-40B4-BE49-F238E27FC236}">
+                <a16:creationId xmlns:a16="http://schemas.microsoft.com/office/drawing/2014/main" id="{DCC542E2-230A-3F4D-BE4A-E4C7A5AF897F}"/>
+              </a:ext>
+            </a:extLst>
+          </p:cNvPr>
+          <p:cNvPicPr>
+            <a:picLocks noChangeAspect="1"/>
+          </p:cNvPicPr>
+          <p:nvPr/>
+        </p:nvPicPr>
+        <p:blipFill>
+          <a:blip r:embed="rId4"/>
+          <a:stretch>
+            <a:fillRect/>
+          </a:stretch>
+        </p:blipFill>
+        <p:spPr>
+          <a:xfrm>
+            <a:off x="5048250" y="4036201"/>
+            <a:ext cx="2095500" cy="469900"/>
+          </a:xfrm>
+          <a:prstGeom prst="rect">
+            <a:avLst/>
+          </a:prstGeom>
+        </p:spPr>
+      </p:pic>
+    </p:spTree>
+    <p:extLst>
+      <p:ext uri="{BB962C8B-B14F-4D97-AF65-F5344CB8AC3E}">
+        <p14:creationId xmlns:p14="http://schemas.microsoft.com/office/powerpoint/2010/main" val="832299620"/>
+      </p:ext>
+    </p:extLst>
+  </p:cSld>
+  <p:clrMapOvr>
+    <a:masterClrMapping/>
+  </p:clrMapOvr>
+</p:sld>
+</file>
+
+<file path=ppt/slides/slide22.xml><?xml version="1.0" encoding="utf-8"?>
+<p:sld xmlns:a="http://schemas.openxmlformats.org/drawingml/2006/main" xmlns:r="http://schemas.openxmlformats.org/officeDocument/2006/relationships" xmlns:p="http://schemas.openxmlformats.org/presentationml/2006/main">
+  <p:cSld>
+    <p:spTree>
+      <p:nvGrpSpPr>
+        <p:cNvPr id="1" name=""/>
+        <p:cNvGrpSpPr/>
+        <p:nvPr/>
+      </p:nvGrpSpPr>
+      <p:grpSpPr>
+        <a:xfrm>
+          <a:off x="0" y="0"/>
+          <a:ext cx="0" cy="0"/>
+          <a:chOff x="0" y="0"/>
+          <a:chExt cx="0" cy="0"/>
+        </a:xfrm>
+      </p:grpSpPr>
+      <p:sp>
+        <p:nvSpPr>
+          <p:cNvPr id="3" name="TextBox 2">
+            <a:extLst>
+              <a:ext uri="{FF2B5EF4-FFF2-40B4-BE49-F238E27FC236}">
                 <a16:creationId xmlns:a16="http://schemas.microsoft.com/office/drawing/2014/main" id="{E5ECC84A-2048-7A4E-894F-D7B3CE827C35}"/>
               </a:ext>
             </a:extLst>
@@ -6513,7 +7253,7 @@
         <p:spPr>
           <a:xfrm>
             <a:off x="863029" y="1383034"/>
-            <a:ext cx="10212511" cy="2123658"/>
+            <a:ext cx="10212511" cy="4493538"/>
           </a:xfrm>
           <a:prstGeom prst="rect">
             <a:avLst/>
@@ -6531,15 +7271,7 @@
             </a:pPr>
             <a:r>
               <a:rPr lang="en-US" sz="2200" dirty="0"/>
-              <a:t>Calculate the horizontal strain components from the displacement field from the </a:t>
-            </a:r>
-            <a:r>
-              <a:rPr lang="en-US" sz="2200" dirty="0" err="1"/>
-              <a:t>Palu</a:t>
-            </a:r>
-            <a:r>
-              <a:rPr lang="en-US" sz="2200" dirty="0"/>
-              <a:t> landslides. Plot the trace of the strain tensor and overlay it with the principal strain axes - interpret this geologically.</a:t>
+              <a:t>From the horizontal displacement field given to you, first plot the displacement vectors on the elevation grid. </a:t>
             </a:r>
           </a:p>
           <a:p>
@@ -6548,7 +7280,43 @@
             </a:pPr>
             <a:r>
               <a:rPr lang="en-US" sz="2200" dirty="0"/>
-              <a:t>Using the potential field given to you, derive the displacement field numerically and compare it to the analytical solution. What does the potential function represent? Compute the strains and rotational components of this displacement field. </a:t>
+              <a:t>Project the displacements on to the elevation gradient direction (unit vector) – to do this you will have to resample either the displacements or the elevation data. Discuss what this quantity means?</a:t>
+            </a:r>
+          </a:p>
+          <a:p>
+            <a:pPr marL="457200" indent="-457200">
+              <a:buAutoNum type="arabicPeriod"/>
+            </a:pPr>
+            <a:r>
+              <a:rPr lang="en-US" sz="2200" dirty="0"/>
+              <a:t>Estimate the total change in GPE due to materials moving. Hint: to do this you will have to interpolate the displacements and compute the 2-d integral of down-slope mass transport.</a:t>
+            </a:r>
+          </a:p>
+          <a:p>
+            <a:pPr marL="457200" indent="-457200">
+              <a:buAutoNum type="arabicPeriod"/>
+            </a:pPr>
+            <a:r>
+              <a:rPr lang="en-US" sz="2200" dirty="0"/>
+              <a:t>Calculate the horizontal strain components from the displacement field </a:t>
+            </a:r>
+          </a:p>
+          <a:p>
+            <a:pPr marL="457200" indent="-457200">
+              <a:buAutoNum type="arabicPeriod"/>
+            </a:pPr>
+            <a:r>
+              <a:rPr lang="en-US" sz="2200" dirty="0"/>
+              <a:t>Plot the trace of the strain tensor and overlay it with displacement field. What does the trace represent?</a:t>
+            </a:r>
+          </a:p>
+          <a:p>
+            <a:pPr marL="457200" indent="-457200">
+              <a:buAutoNum type="arabicPeriod"/>
+            </a:pPr>
+            <a:r>
+              <a:rPr lang="en-US" sz="2200" dirty="0"/>
+              <a:t>Bonus: plot the principal strains at each point (maybe not each point because that will look overcrowded)</a:t>
             </a:r>
           </a:p>
         </p:txBody>

</xml_diff>